<commit_message>
Zaloha verze z laptopu.
</commit_message>
<xml_diff>
--- a/Physiolibrary/Resources/Documentation/Physiolibrary v2.3.pptx
+++ b/Physiolibrary/Resources/Documentation/Physiolibrary v2.3.pptx
@@ -142,6 +142,10 @@
 </p:presentation>
 </file>
 
+<file path=ppt/revisionInfo.xml><?xml version="1.0" encoding="utf-8"?>
+<p1510:revInfo xmlns:a="http://schemas.openxmlformats.org/drawingml/2006/main" xmlns:r="http://schemas.openxmlformats.org/officeDocument/2006/relationships" xmlns:p1510="http://schemas.microsoft.com/office/powerpoint/2015/10/main"/>
+</file>
+
 <file path=ppt/slideLayouts/slideLayout1.xml><?xml version="1.0" encoding="utf-8"?>
 <p:sldLayout xmlns:a="http://schemas.openxmlformats.org/drawingml/2006/main" xmlns:r="http://schemas.openxmlformats.org/officeDocument/2006/relationships" xmlns:p="http://schemas.openxmlformats.org/presentationml/2006/main" type="title" preserve="1">
   <p:cSld name="Úvodní snímek">
@@ -180,10 +184,9 @@
           <a:lstStyle/>
           <a:p>
             <a:r>
-              <a:rPr lang="cs-CZ" smtClean="0"/>
+              <a:rPr lang="cs-CZ"/>
               <a:t>Klepnutím lze upravit styl předlohy nadpisů.</a:t>
             </a:r>
-            <a:endParaRPr lang="cs-CZ"/>
           </a:p>
         </p:txBody>
       </p:sp>
@@ -299,10 +302,9 @@
           </a:lstStyle>
           <a:p>
             <a:r>
-              <a:rPr lang="cs-CZ" smtClean="0"/>
+              <a:rPr lang="cs-CZ"/>
               <a:t>Klepnutím lze upravit styl předlohy podnadpisů.</a:t>
             </a:r>
-            <a:endParaRPr lang="cs-CZ"/>
           </a:p>
         </p:txBody>
       </p:sp>
@@ -324,7 +326,7 @@
             <a:fld id="{18A2481B-5154-415F-B752-558547769AA3}" type="datetimeFigureOut">
               <a:rPr lang="cs-CZ" smtClean="0"/>
               <a:pPr/>
-              <a:t>19. 11. 2014</a:t>
+              <a:t>22. 10. 2017</a:t>
             </a:fld>
             <a:endParaRPr lang="cs-CZ"/>
           </a:p>
@@ -414,10 +416,9 @@
           <a:lstStyle/>
           <a:p>
             <a:r>
-              <a:rPr lang="cs-CZ" smtClean="0"/>
+              <a:rPr lang="cs-CZ"/>
               <a:t>Klepnutím lze upravit styl předlohy nadpisů.</a:t>
             </a:r>
-            <a:endParaRPr lang="cs-CZ"/>
           </a:p>
         </p:txBody>
       </p:sp>
@@ -438,38 +439,37 @@
           <a:p>
             <a:pPr lvl="0"/>
             <a:r>
-              <a:rPr lang="cs-CZ" smtClean="0"/>
+              <a:rPr lang="cs-CZ"/>
               <a:t>Klepnutím lze upravit styly předlohy textu.</a:t>
             </a:r>
           </a:p>
           <a:p>
             <a:pPr lvl="1"/>
             <a:r>
-              <a:rPr lang="cs-CZ" smtClean="0"/>
+              <a:rPr lang="cs-CZ"/>
               <a:t>Druhá úroveň</a:t>
             </a:r>
           </a:p>
           <a:p>
             <a:pPr lvl="2"/>
             <a:r>
-              <a:rPr lang="cs-CZ" smtClean="0"/>
+              <a:rPr lang="cs-CZ"/>
               <a:t>Třetí úroveň</a:t>
             </a:r>
           </a:p>
           <a:p>
             <a:pPr lvl="3"/>
             <a:r>
-              <a:rPr lang="cs-CZ" smtClean="0"/>
+              <a:rPr lang="cs-CZ"/>
               <a:t>Čtvrtá úroveň</a:t>
             </a:r>
           </a:p>
           <a:p>
             <a:pPr lvl="4"/>
             <a:r>
-              <a:rPr lang="cs-CZ" smtClean="0"/>
+              <a:rPr lang="cs-CZ"/>
               <a:t>Pátá úroveň</a:t>
             </a:r>
-            <a:endParaRPr lang="cs-CZ"/>
           </a:p>
         </p:txBody>
       </p:sp>
@@ -491,7 +491,7 @@
             <a:fld id="{18A2481B-5154-415F-B752-558547769AA3}" type="datetimeFigureOut">
               <a:rPr lang="cs-CZ" smtClean="0"/>
               <a:pPr/>
-              <a:t>19. 11. 2014</a:t>
+              <a:t>22. 10. 2017</a:t>
             </a:fld>
             <a:endParaRPr lang="cs-CZ"/>
           </a:p>
@@ -586,10 +586,9 @@
           <a:lstStyle/>
           <a:p>
             <a:r>
-              <a:rPr lang="cs-CZ" smtClean="0"/>
+              <a:rPr lang="cs-CZ"/>
               <a:t>Klepnutím lze upravit styl předlohy nadpisů.</a:t>
             </a:r>
-            <a:endParaRPr lang="cs-CZ"/>
           </a:p>
         </p:txBody>
       </p:sp>
@@ -615,38 +614,37 @@
           <a:p>
             <a:pPr lvl="0"/>
             <a:r>
-              <a:rPr lang="cs-CZ" smtClean="0"/>
+              <a:rPr lang="cs-CZ"/>
               <a:t>Klepnutím lze upravit styly předlohy textu.</a:t>
             </a:r>
           </a:p>
           <a:p>
             <a:pPr lvl="1"/>
             <a:r>
-              <a:rPr lang="cs-CZ" smtClean="0"/>
+              <a:rPr lang="cs-CZ"/>
               <a:t>Druhá úroveň</a:t>
             </a:r>
           </a:p>
           <a:p>
             <a:pPr lvl="2"/>
             <a:r>
-              <a:rPr lang="cs-CZ" smtClean="0"/>
+              <a:rPr lang="cs-CZ"/>
               <a:t>Třetí úroveň</a:t>
             </a:r>
           </a:p>
           <a:p>
             <a:pPr lvl="3"/>
             <a:r>
-              <a:rPr lang="cs-CZ" smtClean="0"/>
+              <a:rPr lang="cs-CZ"/>
               <a:t>Čtvrtá úroveň</a:t>
             </a:r>
           </a:p>
           <a:p>
             <a:pPr lvl="4"/>
             <a:r>
-              <a:rPr lang="cs-CZ" smtClean="0"/>
+              <a:rPr lang="cs-CZ"/>
               <a:t>Pátá úroveň</a:t>
             </a:r>
-            <a:endParaRPr lang="cs-CZ"/>
           </a:p>
         </p:txBody>
       </p:sp>
@@ -668,7 +666,7 @@
             <a:fld id="{18A2481B-5154-415F-B752-558547769AA3}" type="datetimeFigureOut">
               <a:rPr lang="cs-CZ" smtClean="0"/>
               <a:pPr/>
-              <a:t>19. 11. 2014</a:t>
+              <a:t>22. 10. 2017</a:t>
             </a:fld>
             <a:endParaRPr lang="cs-CZ"/>
           </a:p>
@@ -758,10 +756,9 @@
           <a:lstStyle/>
           <a:p>
             <a:r>
-              <a:rPr lang="cs-CZ" smtClean="0"/>
+              <a:rPr lang="cs-CZ"/>
               <a:t>Klepnutím lze upravit styl předlohy nadpisů.</a:t>
             </a:r>
-            <a:endParaRPr lang="cs-CZ"/>
           </a:p>
         </p:txBody>
       </p:sp>
@@ -782,38 +779,37 @@
           <a:p>
             <a:pPr lvl="0"/>
             <a:r>
-              <a:rPr lang="cs-CZ" smtClean="0"/>
+              <a:rPr lang="cs-CZ"/>
               <a:t>Klepnutím lze upravit styly předlohy textu.</a:t>
             </a:r>
           </a:p>
           <a:p>
             <a:pPr lvl="1"/>
             <a:r>
-              <a:rPr lang="cs-CZ" smtClean="0"/>
+              <a:rPr lang="cs-CZ"/>
               <a:t>Druhá úroveň</a:t>
             </a:r>
           </a:p>
           <a:p>
             <a:pPr lvl="2"/>
             <a:r>
-              <a:rPr lang="cs-CZ" smtClean="0"/>
+              <a:rPr lang="cs-CZ"/>
               <a:t>Třetí úroveň</a:t>
             </a:r>
           </a:p>
           <a:p>
             <a:pPr lvl="3"/>
             <a:r>
-              <a:rPr lang="cs-CZ" smtClean="0"/>
+              <a:rPr lang="cs-CZ"/>
               <a:t>Čtvrtá úroveň</a:t>
             </a:r>
           </a:p>
           <a:p>
             <a:pPr lvl="4"/>
             <a:r>
-              <a:rPr lang="cs-CZ" smtClean="0"/>
+              <a:rPr lang="cs-CZ"/>
               <a:t>Pátá úroveň</a:t>
             </a:r>
-            <a:endParaRPr lang="cs-CZ"/>
           </a:p>
         </p:txBody>
       </p:sp>
@@ -835,7 +831,7 @@
             <a:fld id="{18A2481B-5154-415F-B752-558547769AA3}" type="datetimeFigureOut">
               <a:rPr lang="cs-CZ" smtClean="0"/>
               <a:pPr/>
-              <a:t>19. 11. 2014</a:t>
+              <a:t>22. 10. 2017</a:t>
             </a:fld>
             <a:endParaRPr lang="cs-CZ"/>
           </a:p>
@@ -934,10 +930,9 @@
           </a:lstStyle>
           <a:p>
             <a:r>
-              <a:rPr lang="cs-CZ" smtClean="0"/>
+              <a:rPr lang="cs-CZ"/>
               <a:t>Klepnutím lze upravit styl předlohy nadpisů.</a:t>
             </a:r>
-            <a:endParaRPr lang="cs-CZ"/>
           </a:p>
         </p:txBody>
       </p:sp>
@@ -1054,7 +1049,7 @@
           <a:p>
             <a:pPr lvl="0"/>
             <a:r>
-              <a:rPr lang="cs-CZ" smtClean="0"/>
+              <a:rPr lang="cs-CZ"/>
               <a:t>Klepnutím lze upravit styly předlohy textu.</a:t>
             </a:r>
           </a:p>
@@ -1078,7 +1073,7 @@
             <a:fld id="{18A2481B-5154-415F-B752-558547769AA3}" type="datetimeFigureOut">
               <a:rPr lang="cs-CZ" smtClean="0"/>
               <a:pPr/>
-              <a:t>19. 11. 2014</a:t>
+              <a:t>22. 10. 2017</a:t>
             </a:fld>
             <a:endParaRPr lang="cs-CZ"/>
           </a:p>
@@ -1168,10 +1163,9 @@
           <a:lstStyle/>
           <a:p>
             <a:r>
-              <a:rPr lang="cs-CZ" smtClean="0"/>
+              <a:rPr lang="cs-CZ"/>
               <a:t>Klepnutím lze upravit styl předlohy nadpisů.</a:t>
             </a:r>
-            <a:endParaRPr lang="cs-CZ"/>
           </a:p>
         </p:txBody>
       </p:sp>
@@ -1225,38 +1219,37 @@
           <a:p>
             <a:pPr lvl="0"/>
             <a:r>
-              <a:rPr lang="cs-CZ" smtClean="0"/>
+              <a:rPr lang="cs-CZ"/>
               <a:t>Klepnutím lze upravit styly předlohy textu.</a:t>
             </a:r>
           </a:p>
           <a:p>
             <a:pPr lvl="1"/>
             <a:r>
-              <a:rPr lang="cs-CZ" smtClean="0"/>
+              <a:rPr lang="cs-CZ"/>
               <a:t>Druhá úroveň</a:t>
             </a:r>
           </a:p>
           <a:p>
             <a:pPr lvl="2"/>
             <a:r>
-              <a:rPr lang="cs-CZ" smtClean="0"/>
+              <a:rPr lang="cs-CZ"/>
               <a:t>Třetí úroveň</a:t>
             </a:r>
           </a:p>
           <a:p>
             <a:pPr lvl="3"/>
             <a:r>
-              <a:rPr lang="cs-CZ" smtClean="0"/>
+              <a:rPr lang="cs-CZ"/>
               <a:t>Čtvrtá úroveň</a:t>
             </a:r>
           </a:p>
           <a:p>
             <a:pPr lvl="4"/>
             <a:r>
-              <a:rPr lang="cs-CZ" smtClean="0"/>
+              <a:rPr lang="cs-CZ"/>
               <a:t>Pátá úroveň</a:t>
             </a:r>
-            <a:endParaRPr lang="cs-CZ"/>
           </a:p>
         </p:txBody>
       </p:sp>
@@ -1310,38 +1303,37 @@
           <a:p>
             <a:pPr lvl="0"/>
             <a:r>
-              <a:rPr lang="cs-CZ" smtClean="0"/>
+              <a:rPr lang="cs-CZ"/>
               <a:t>Klepnutím lze upravit styly předlohy textu.</a:t>
             </a:r>
           </a:p>
           <a:p>
             <a:pPr lvl="1"/>
             <a:r>
-              <a:rPr lang="cs-CZ" smtClean="0"/>
+              <a:rPr lang="cs-CZ"/>
               <a:t>Druhá úroveň</a:t>
             </a:r>
           </a:p>
           <a:p>
             <a:pPr lvl="2"/>
             <a:r>
-              <a:rPr lang="cs-CZ" smtClean="0"/>
+              <a:rPr lang="cs-CZ"/>
               <a:t>Třetí úroveň</a:t>
             </a:r>
           </a:p>
           <a:p>
             <a:pPr lvl="3"/>
             <a:r>
-              <a:rPr lang="cs-CZ" smtClean="0"/>
+              <a:rPr lang="cs-CZ"/>
               <a:t>Čtvrtá úroveň</a:t>
             </a:r>
           </a:p>
           <a:p>
             <a:pPr lvl="4"/>
             <a:r>
-              <a:rPr lang="cs-CZ" smtClean="0"/>
+              <a:rPr lang="cs-CZ"/>
               <a:t>Pátá úroveň</a:t>
             </a:r>
-            <a:endParaRPr lang="cs-CZ"/>
           </a:p>
         </p:txBody>
       </p:sp>
@@ -1363,7 +1355,7 @@
             <a:fld id="{18A2481B-5154-415F-B752-558547769AA3}" type="datetimeFigureOut">
               <a:rPr lang="cs-CZ" smtClean="0"/>
               <a:pPr/>
-              <a:t>19. 11. 2014</a:t>
+              <a:t>22. 10. 2017</a:t>
             </a:fld>
             <a:endParaRPr lang="cs-CZ"/>
           </a:p>
@@ -1457,10 +1449,9 @@
           </a:lstStyle>
           <a:p>
             <a:r>
-              <a:rPr lang="cs-CZ" smtClean="0"/>
+              <a:rPr lang="cs-CZ"/>
               <a:t>Klepnutím lze upravit styl předlohy nadpisů.</a:t>
             </a:r>
-            <a:endParaRPr lang="cs-CZ"/>
           </a:p>
         </p:txBody>
       </p:sp>
@@ -1523,7 +1514,7 @@
           <a:p>
             <a:pPr lvl="0"/>
             <a:r>
-              <a:rPr lang="cs-CZ" smtClean="0"/>
+              <a:rPr lang="cs-CZ"/>
               <a:t>Klepnutím lze upravit styly předlohy textu.</a:t>
             </a:r>
           </a:p>
@@ -1579,38 +1570,37 @@
           <a:p>
             <a:pPr lvl="0"/>
             <a:r>
-              <a:rPr lang="cs-CZ" smtClean="0"/>
+              <a:rPr lang="cs-CZ"/>
               <a:t>Klepnutím lze upravit styly předlohy textu.</a:t>
             </a:r>
           </a:p>
           <a:p>
             <a:pPr lvl="1"/>
             <a:r>
-              <a:rPr lang="cs-CZ" smtClean="0"/>
+              <a:rPr lang="cs-CZ"/>
               <a:t>Druhá úroveň</a:t>
             </a:r>
           </a:p>
           <a:p>
             <a:pPr lvl="2"/>
             <a:r>
-              <a:rPr lang="cs-CZ" smtClean="0"/>
+              <a:rPr lang="cs-CZ"/>
               <a:t>Třetí úroveň</a:t>
             </a:r>
           </a:p>
           <a:p>
             <a:pPr lvl="3"/>
             <a:r>
-              <a:rPr lang="cs-CZ" smtClean="0"/>
+              <a:rPr lang="cs-CZ"/>
               <a:t>Čtvrtá úroveň</a:t>
             </a:r>
           </a:p>
           <a:p>
             <a:pPr lvl="4"/>
             <a:r>
-              <a:rPr lang="cs-CZ" smtClean="0"/>
+              <a:rPr lang="cs-CZ"/>
               <a:t>Pátá úroveň</a:t>
             </a:r>
-            <a:endParaRPr lang="cs-CZ"/>
           </a:p>
         </p:txBody>
       </p:sp>
@@ -1673,7 +1663,7 @@
           <a:p>
             <a:pPr lvl="0"/>
             <a:r>
-              <a:rPr lang="cs-CZ" smtClean="0"/>
+              <a:rPr lang="cs-CZ"/>
               <a:t>Klepnutím lze upravit styly předlohy textu.</a:t>
             </a:r>
           </a:p>
@@ -1729,38 +1719,37 @@
           <a:p>
             <a:pPr lvl="0"/>
             <a:r>
-              <a:rPr lang="cs-CZ" smtClean="0"/>
+              <a:rPr lang="cs-CZ"/>
               <a:t>Klepnutím lze upravit styly předlohy textu.</a:t>
             </a:r>
           </a:p>
           <a:p>
             <a:pPr lvl="1"/>
             <a:r>
-              <a:rPr lang="cs-CZ" smtClean="0"/>
+              <a:rPr lang="cs-CZ"/>
               <a:t>Druhá úroveň</a:t>
             </a:r>
           </a:p>
           <a:p>
             <a:pPr lvl="2"/>
             <a:r>
-              <a:rPr lang="cs-CZ" smtClean="0"/>
+              <a:rPr lang="cs-CZ"/>
               <a:t>Třetí úroveň</a:t>
             </a:r>
           </a:p>
           <a:p>
             <a:pPr lvl="3"/>
             <a:r>
-              <a:rPr lang="cs-CZ" smtClean="0"/>
+              <a:rPr lang="cs-CZ"/>
               <a:t>Čtvrtá úroveň</a:t>
             </a:r>
           </a:p>
           <a:p>
             <a:pPr lvl="4"/>
             <a:r>
-              <a:rPr lang="cs-CZ" smtClean="0"/>
+              <a:rPr lang="cs-CZ"/>
               <a:t>Pátá úroveň</a:t>
             </a:r>
-            <a:endParaRPr lang="cs-CZ"/>
           </a:p>
         </p:txBody>
       </p:sp>
@@ -1782,7 +1771,7 @@
             <a:fld id="{18A2481B-5154-415F-B752-558547769AA3}" type="datetimeFigureOut">
               <a:rPr lang="cs-CZ" smtClean="0"/>
               <a:pPr/>
-              <a:t>19. 11. 2014</a:t>
+              <a:t>22. 10. 2017</a:t>
             </a:fld>
             <a:endParaRPr lang="cs-CZ"/>
           </a:p>
@@ -1872,10 +1861,9 @@
           <a:lstStyle/>
           <a:p>
             <a:r>
-              <a:rPr lang="cs-CZ" smtClean="0"/>
+              <a:rPr lang="cs-CZ"/>
               <a:t>Klepnutím lze upravit styl předlohy nadpisů.</a:t>
             </a:r>
-            <a:endParaRPr lang="cs-CZ"/>
           </a:p>
         </p:txBody>
       </p:sp>
@@ -1897,7 +1885,7 @@
             <a:fld id="{18A2481B-5154-415F-B752-558547769AA3}" type="datetimeFigureOut">
               <a:rPr lang="cs-CZ" smtClean="0"/>
               <a:pPr/>
-              <a:t>19. 11. 2014</a:t>
+              <a:t>22. 10. 2017</a:t>
             </a:fld>
             <a:endParaRPr lang="cs-CZ"/>
           </a:p>
@@ -1989,7 +1977,7 @@
             <a:fld id="{18A2481B-5154-415F-B752-558547769AA3}" type="datetimeFigureOut">
               <a:rPr lang="cs-CZ" smtClean="0"/>
               <a:pPr/>
-              <a:t>19. 11. 2014</a:t>
+              <a:t>22. 10. 2017</a:t>
             </a:fld>
             <a:endParaRPr lang="cs-CZ"/>
           </a:p>
@@ -2088,10 +2076,9 @@
           </a:lstStyle>
           <a:p>
             <a:r>
-              <a:rPr lang="cs-CZ" smtClean="0"/>
+              <a:rPr lang="cs-CZ"/>
               <a:t>Klepnutím lze upravit styl předlohy nadpisů.</a:t>
             </a:r>
-            <a:endParaRPr lang="cs-CZ"/>
           </a:p>
         </p:txBody>
       </p:sp>
@@ -2145,38 +2132,37 @@
           <a:p>
             <a:pPr lvl="0"/>
             <a:r>
-              <a:rPr lang="cs-CZ" smtClean="0"/>
+              <a:rPr lang="cs-CZ"/>
               <a:t>Klepnutím lze upravit styly předlohy textu.</a:t>
             </a:r>
           </a:p>
           <a:p>
             <a:pPr lvl="1"/>
             <a:r>
-              <a:rPr lang="cs-CZ" smtClean="0"/>
+              <a:rPr lang="cs-CZ"/>
               <a:t>Druhá úroveň</a:t>
             </a:r>
           </a:p>
           <a:p>
             <a:pPr lvl="2"/>
             <a:r>
-              <a:rPr lang="cs-CZ" smtClean="0"/>
+              <a:rPr lang="cs-CZ"/>
               <a:t>Třetí úroveň</a:t>
             </a:r>
           </a:p>
           <a:p>
             <a:pPr lvl="3"/>
             <a:r>
-              <a:rPr lang="cs-CZ" smtClean="0"/>
+              <a:rPr lang="cs-CZ"/>
               <a:t>Čtvrtá úroveň</a:t>
             </a:r>
           </a:p>
           <a:p>
             <a:pPr lvl="4"/>
             <a:r>
-              <a:rPr lang="cs-CZ" smtClean="0"/>
+              <a:rPr lang="cs-CZ"/>
               <a:t>Pátá úroveň</a:t>
             </a:r>
-            <a:endParaRPr lang="cs-CZ"/>
           </a:p>
         </p:txBody>
       </p:sp>
@@ -2239,7 +2225,7 @@
           <a:p>
             <a:pPr lvl="0"/>
             <a:r>
-              <a:rPr lang="cs-CZ" smtClean="0"/>
+              <a:rPr lang="cs-CZ"/>
               <a:t>Klepnutím lze upravit styly předlohy textu.</a:t>
             </a:r>
           </a:p>
@@ -2263,7 +2249,7 @@
             <a:fld id="{18A2481B-5154-415F-B752-558547769AA3}" type="datetimeFigureOut">
               <a:rPr lang="cs-CZ" smtClean="0"/>
               <a:pPr/>
-              <a:t>19. 11. 2014</a:t>
+              <a:t>22. 10. 2017</a:t>
             </a:fld>
             <a:endParaRPr lang="cs-CZ"/>
           </a:p>
@@ -2362,10 +2348,9 @@
           </a:lstStyle>
           <a:p>
             <a:r>
-              <a:rPr lang="cs-CZ" smtClean="0"/>
+              <a:rPr lang="cs-CZ"/>
               <a:t>Klepnutím lze upravit styl předlohy nadpisů.</a:t>
             </a:r>
-            <a:endParaRPr lang="cs-CZ"/>
           </a:p>
         </p:txBody>
       </p:sp>
@@ -2489,7 +2474,7 @@
           <a:p>
             <a:pPr lvl="0"/>
             <a:r>
-              <a:rPr lang="cs-CZ" smtClean="0"/>
+              <a:rPr lang="cs-CZ"/>
               <a:t>Klepnutím lze upravit styly předlohy textu.</a:t>
             </a:r>
           </a:p>
@@ -2513,7 +2498,7 @@
             <a:fld id="{18A2481B-5154-415F-B752-558547769AA3}" type="datetimeFigureOut">
               <a:rPr lang="cs-CZ" smtClean="0"/>
               <a:pPr/>
-              <a:t>19. 11. 2014</a:t>
+              <a:t>22. 10. 2017</a:t>
             </a:fld>
             <a:endParaRPr lang="cs-CZ"/>
           </a:p>
@@ -2618,10 +2603,9 @@
           <a:lstStyle/>
           <a:p>
             <a:r>
-              <a:rPr lang="cs-CZ" smtClean="0"/>
+              <a:rPr lang="cs-CZ"/>
               <a:t>Klepnutím lze upravit styl předlohy nadpisů.</a:t>
             </a:r>
-            <a:endParaRPr lang="cs-CZ"/>
           </a:p>
         </p:txBody>
       </p:sp>
@@ -2652,38 +2636,37 @@
           <a:p>
             <a:pPr lvl="0"/>
             <a:r>
-              <a:rPr lang="cs-CZ" smtClean="0"/>
+              <a:rPr lang="cs-CZ"/>
               <a:t>Klepnutím lze upravit styly předlohy textu.</a:t>
             </a:r>
           </a:p>
           <a:p>
             <a:pPr lvl="1"/>
             <a:r>
-              <a:rPr lang="cs-CZ" smtClean="0"/>
+              <a:rPr lang="cs-CZ"/>
               <a:t>Druhá úroveň</a:t>
             </a:r>
           </a:p>
           <a:p>
             <a:pPr lvl="2"/>
             <a:r>
-              <a:rPr lang="cs-CZ" smtClean="0"/>
+              <a:rPr lang="cs-CZ"/>
               <a:t>Třetí úroveň</a:t>
             </a:r>
           </a:p>
           <a:p>
             <a:pPr lvl="3"/>
             <a:r>
-              <a:rPr lang="cs-CZ" smtClean="0"/>
+              <a:rPr lang="cs-CZ"/>
               <a:t>Čtvrtá úroveň</a:t>
             </a:r>
           </a:p>
           <a:p>
             <a:pPr lvl="4"/>
             <a:r>
-              <a:rPr lang="cs-CZ" smtClean="0"/>
+              <a:rPr lang="cs-CZ"/>
               <a:t>Pátá úroveň</a:t>
             </a:r>
-            <a:endParaRPr lang="cs-CZ"/>
           </a:p>
         </p:txBody>
       </p:sp>
@@ -2723,7 +2706,7 @@
             <a:fld id="{18A2481B-5154-415F-B752-558547769AA3}" type="datetimeFigureOut">
               <a:rPr lang="cs-CZ" smtClean="0"/>
               <a:pPr/>
-              <a:t>19. 11. 2014</a:t>
+              <a:t>22. 10. 2017</a:t>
             </a:fld>
             <a:endParaRPr lang="cs-CZ"/>
           </a:p>
@@ -3110,11 +3093,11 @@
           <a:lstStyle/>
           <a:p>
             <a:r>
-              <a:rPr lang="en-US" dirty="0" err="1" smtClean="0"/>
+              <a:rPr lang="en-US" dirty="0" err="1"/>
               <a:t>Physiolibrary</a:t>
             </a:r>
             <a:r>
-              <a:rPr lang="en-US" dirty="0" smtClean="0"/>
+              <a:rPr lang="en-US" dirty="0"/>
               <a:t> 2.3</a:t>
             </a:r>
             <a:endParaRPr lang="cs-CZ" dirty="0"/>
@@ -3137,7 +3120,7 @@
           <a:lstStyle/>
           <a:p>
             <a:r>
-              <a:rPr lang="en-US" dirty="0" smtClean="0"/>
+              <a:rPr lang="en-US" dirty="0"/>
               <a:t>www.physiolibrary.org</a:t>
             </a:r>
             <a:endParaRPr lang="cs-CZ" dirty="0"/>
@@ -3149,13 +3132,6 @@
   <p:clrMapOvr>
     <a:masterClrMapping/>
   </p:clrMapOvr>
-  <p:timing>
-    <p:tnLst>
-      <p:par>
-        <p:cTn id="1" dur="indefinite" restart="never" nodeType="tmRoot"/>
-      </p:par>
-    </p:tnLst>
-  </p:timing>
 </p:sld>
 </file>
 
@@ -3192,7 +3168,7 @@
           <a:lstStyle/>
           <a:p>
             <a:r>
-              <a:rPr lang="en-US" dirty="0" smtClean="0"/>
+              <a:rPr lang="en-US" dirty="0"/>
               <a:t>Chemical Reaction</a:t>
             </a:r>
             <a:endParaRPr lang="cs-CZ" dirty="0"/>
@@ -3260,13 +3236,6 @@
   <p:clrMapOvr>
     <a:masterClrMapping/>
   </p:clrMapOvr>
-  <p:timing>
-    <p:tnLst>
-      <p:par>
-        <p:cTn id="1" dur="indefinite" restart="never" nodeType="tmRoot"/>
-      </p:par>
-    </p:tnLst>
-  </p:timing>
 </p:sld>
 </file>
 
@@ -3303,7 +3272,7 @@
           <a:lstStyle/>
           <a:p>
             <a:r>
-              <a:rPr lang="en-US" dirty="0" smtClean="0"/>
+              <a:rPr lang="en-US" dirty="0"/>
               <a:t>Chemical Reaction</a:t>
             </a:r>
             <a:endParaRPr lang="cs-CZ" dirty="0"/>
@@ -3371,13 +3340,6 @@
   <p:clrMapOvr>
     <a:masterClrMapping/>
   </p:clrMapOvr>
-  <p:timing>
-    <p:tnLst>
-      <p:par>
-        <p:cTn id="1" dur="indefinite" restart="never" nodeType="tmRoot"/>
-      </p:par>
-    </p:tnLst>
-  </p:timing>
 </p:sld>
 </file>
 
@@ -3414,7 +3376,7 @@
           <a:lstStyle/>
           <a:p>
             <a:r>
-              <a:rPr lang="en-US" dirty="0" smtClean="0"/>
+              <a:rPr lang="en-US" dirty="0"/>
               <a:t>Chemical Reaction</a:t>
             </a:r>
             <a:endParaRPr lang="cs-CZ" dirty="0"/>
@@ -3482,13 +3444,6 @@
   <p:clrMapOvr>
     <a:masterClrMapping/>
   </p:clrMapOvr>
-  <p:timing>
-    <p:tnLst>
-      <p:par>
-        <p:cTn id="1" dur="indefinite" restart="never" nodeType="tmRoot"/>
-      </p:par>
-    </p:tnLst>
-  </p:timing>
 </p:sld>
 </file>
 
@@ -3572,16 +3527,12 @@
           <a:lstStyle/>
           <a:p>
             <a:r>
-              <a:rPr lang="cs-CZ" dirty="0" smtClean="0"/>
+              <a:rPr lang="cs-CZ" dirty="0"/>
               <a:t>ARRAY</a:t>
             </a:r>
             <a:r>
-              <a:rPr lang="en-US" dirty="0" smtClean="0"/>
-              <a:t> </a:t>
-            </a:r>
-            <a:r>
-              <a:rPr lang="en-US" dirty="0" smtClean="0"/>
-              <a:t>INPUTS</a:t>
+              <a:rPr lang="en-US" dirty="0"/>
+              <a:t> INPUTS</a:t>
             </a:r>
             <a:endParaRPr lang="cs-CZ" dirty="0"/>
           </a:p>
@@ -3661,13 +3612,6 @@
   <p:clrMapOvr>
     <a:masterClrMapping/>
   </p:clrMapOvr>
-  <p:timing>
-    <p:tnLst>
-      <p:par>
-        <p:cTn id="1" dur="indefinite" restart="never" nodeType="tmRoot"/>
-      </p:par>
-    </p:tnLst>
-  </p:timing>
 </p:sld>
 </file>
 
@@ -3704,7 +3648,7 @@
           <a:lstStyle/>
           <a:p>
             <a:r>
-              <a:rPr lang="en-US" dirty="0" smtClean="0"/>
+              <a:rPr lang="en-US" dirty="0"/>
               <a:t>STEADY STATES</a:t>
             </a:r>
             <a:endParaRPr lang="cs-CZ" dirty="0"/>
@@ -3732,15 +3676,15 @@
           <a:lstStyle/>
           <a:p>
             <a:r>
-              <a:rPr lang="en-US" dirty="0" smtClean="0"/>
+              <a:rPr lang="en-US" dirty="0"/>
               <a:t>Zero derivations (</a:t>
             </a:r>
             <a:r>
-              <a:rPr lang="en-US" i="1" dirty="0" smtClean="0"/>
+              <a:rPr lang="en-US" i="1" dirty="0"/>
               <a:t>dependent equation set</a:t>
             </a:r>
             <a:r>
-              <a:rPr lang="en-US" dirty="0" smtClean="0"/>
+              <a:rPr lang="en-US" dirty="0"/>
               <a:t>)</a:t>
             </a:r>
           </a:p>
@@ -4080,13 +4024,6 @@
     <a:masterClrMapping/>
   </p:clrMapOvr>
   <p:transition/>
-  <p:timing>
-    <p:tnLst>
-      <p:par>
-        <p:cTn id="1" dur="indefinite" restart="never" nodeType="tmRoot"/>
-      </p:par>
-    </p:tnLst>
-  </p:timing>
 </p:sld>
 </file>
 
@@ -4160,7 +4097,7 @@
           <a:lstStyle/>
           <a:p>
             <a:r>
-              <a:rPr lang="en-US" dirty="0" smtClean="0"/>
+              <a:rPr lang="en-US" dirty="0"/>
               <a:t>Hydraulic</a:t>
             </a:r>
             <a:endParaRPr lang="cs-CZ" dirty="0"/>
@@ -4196,13 +4133,6 @@
   <p:clrMapOvr>
     <a:masterClrMapping/>
   </p:clrMapOvr>
-  <p:timing>
-    <p:tnLst>
-      <p:par>
-        <p:cTn id="1" dur="indefinite" restart="never" nodeType="tmRoot"/>
-      </p:par>
-    </p:tnLst>
-  </p:timing>
 </p:sld>
 </file>
 
@@ -4268,7 +4198,7 @@
           <a:lstStyle/>
           <a:p>
             <a:r>
-              <a:rPr lang="en-US" dirty="0" smtClean="0"/>
+              <a:rPr lang="en-US" dirty="0"/>
               <a:t>Osmotic</a:t>
             </a:r>
             <a:endParaRPr lang="cs-CZ" dirty="0"/>
@@ -4464,13 +4394,6 @@
   <p:clrMapOvr>
     <a:masterClrMapping/>
   </p:clrMapOvr>
-  <p:timing>
-    <p:tnLst>
-      <p:par>
-        <p:cTn id="1" dur="indefinite" restart="never" nodeType="tmRoot"/>
-      </p:par>
-    </p:tnLst>
-  </p:timing>
 </p:sld>
 </file>
 
@@ -4536,7 +4459,7 @@
           <a:lstStyle/>
           <a:p>
             <a:r>
-              <a:rPr lang="en-US" dirty="0" smtClean="0"/>
+              <a:rPr lang="en-US" dirty="0"/>
               <a:t>Population</a:t>
             </a:r>
             <a:endParaRPr lang="cs-CZ" dirty="0"/>
@@ -4641,13 +4564,6 @@
   <p:clrMapOvr>
     <a:masterClrMapping/>
   </p:clrMapOvr>
-  <p:timing>
-    <p:tnLst>
-      <p:par>
-        <p:cTn id="1" dur="indefinite" restart="never" nodeType="tmRoot"/>
-      </p:par>
-    </p:tnLst>
-  </p:timing>
 </p:sld>
 </file>
 
@@ -4785,7 +4701,7 @@
           <a:lstStyle/>
           <a:p>
             <a:r>
-              <a:rPr lang="en-US" dirty="0" smtClean="0"/>
+              <a:rPr lang="en-US" dirty="0"/>
               <a:t>Thermal</a:t>
             </a:r>
             <a:endParaRPr lang="cs-CZ" dirty="0"/>
@@ -4861,13 +4777,6 @@
   <p:clrMapOvr>
     <a:masterClrMapping/>
   </p:clrMapOvr>
-  <p:timing>
-    <p:tnLst>
-      <p:par>
-        <p:cTn id="1" dur="indefinite" restart="never" nodeType="tmRoot"/>
-      </p:par>
-    </p:tnLst>
-  </p:timing>
 </p:sld>
 </file>
 
@@ -4963,13 +4872,6 @@
   <p:clrMapOvr>
     <a:masterClrMapping/>
   </p:clrMapOvr>
-  <p:timing>
-    <p:tnLst>
-      <p:par>
-        <p:cTn id="1" dur="indefinite" restart="never" nodeType="tmRoot"/>
-      </p:par>
-    </p:tnLst>
-  </p:timing>
 </p:sld>
 </file>
 
@@ -5030,7 +4932,7 @@
           <a:lstStyle/>
           <a:p>
             <a:r>
-              <a:rPr lang="en-US" dirty="0" smtClean="0"/>
+              <a:rPr lang="en-US" dirty="0"/>
               <a:t>Physiolibrary Structure</a:t>
             </a:r>
             <a:endParaRPr lang="cs-CZ" dirty="0"/>
@@ -5186,13 +5088,6 @@
   <p:clrMapOvr>
     <a:masterClrMapping/>
   </p:clrMapOvr>
-  <p:timing>
-    <p:tnLst>
-      <p:par>
-        <p:cTn id="1" dur="indefinite" restart="never" nodeType="tmRoot"/>
-      </p:par>
-    </p:tnLst>
-  </p:timing>
 </p:sld>
 </file>
 
@@ -5234,7 +5129,7 @@
           <a:lstStyle/>
           <a:p>
             <a:r>
-              <a:rPr lang="en-US" dirty="0" smtClean="0"/>
+              <a:rPr lang="en-US" dirty="0"/>
               <a:t>Thank you for your attention!</a:t>
             </a:r>
             <a:endParaRPr lang="cs-CZ" dirty="0"/>
@@ -5265,7 +5160,7 @@
               <a:buNone/>
             </a:pPr>
             <a:r>
-              <a:rPr lang="en-US" dirty="0" smtClean="0"/>
+              <a:rPr lang="en-US" dirty="0"/>
               <a:t>www.physiolibrary.org</a:t>
             </a:r>
             <a:endParaRPr lang="cs-CZ" dirty="0"/>
@@ -5277,13 +5172,6 @@
   <p:clrMapOvr>
     <a:masterClrMapping/>
   </p:clrMapOvr>
-  <p:timing>
-    <p:tnLst>
-      <p:par>
-        <p:cTn id="1" dur="indefinite" restart="never" nodeType="tmRoot"/>
-      </p:par>
-    </p:tnLst>
-  </p:timing>
 </p:sld>
 </file>
 
@@ -5325,7 +5213,7 @@
           <a:lstStyle/>
           <a:p>
             <a:r>
-              <a:rPr lang="en-US" dirty="0" smtClean="0"/>
+              <a:rPr lang="en-US" dirty="0"/>
               <a:t>Icons</a:t>
             </a:r>
             <a:endParaRPr lang="cs-CZ" dirty="0"/>
@@ -5361,13 +5249,6 @@
   <p:clrMapOvr>
     <a:masterClrMapping/>
   </p:clrMapOvr>
-  <p:timing>
-    <p:tnLst>
-      <p:par>
-        <p:cTn id="1" dur="indefinite" restart="never" nodeType="tmRoot"/>
-      </p:par>
-    </p:tnLst>
-  </p:timing>
 </p:sld>
 </file>
 
@@ -5409,7 +5290,7 @@
           <a:lstStyle/>
           <a:p>
             <a:r>
-              <a:rPr lang="en-US" dirty="0" err="1" smtClean="0"/>
+              <a:rPr lang="en-US" dirty="0" err="1"/>
               <a:t>Blocks.Factors</a:t>
             </a:r>
             <a:endParaRPr lang="cs-CZ" dirty="0"/>
@@ -5517,13 +5398,6 @@
   <p:clrMapOvr>
     <a:masterClrMapping/>
   </p:clrMapOvr>
-  <p:timing>
-    <p:tnLst>
-      <p:par>
-        <p:cTn id="1" dur="indefinite" restart="never" nodeType="tmRoot"/>
-      </p:par>
-    </p:tnLst>
-  </p:timing>
 </p:sld>
 </file>
 
@@ -5560,7 +5434,7 @@
           <a:lstStyle/>
           <a:p>
             <a:r>
-              <a:rPr lang="en-US" dirty="0" smtClean="0"/>
+              <a:rPr lang="en-US" dirty="0"/>
               <a:t>Types</a:t>
             </a:r>
             <a:endParaRPr lang="cs-CZ" dirty="0"/>
@@ -5740,13 +5614,6 @@
   <p:clrMapOvr>
     <a:masterClrMapping/>
   </p:clrMapOvr>
-  <p:timing>
-    <p:tnLst>
-      <p:par>
-        <p:cTn id="1" dur="indefinite" restart="never" nodeType="tmRoot"/>
-      </p:par>
-    </p:tnLst>
-  </p:timing>
 </p:sld>
 </file>
 
@@ -5783,7 +5650,7 @@
           <a:lstStyle/>
           <a:p>
             <a:r>
-              <a:rPr lang="en-US" dirty="0" err="1" smtClean="0"/>
+              <a:rPr lang="en-US" dirty="0" err="1"/>
               <a:t>Types.Constants</a:t>
             </a:r>
             <a:endParaRPr lang="cs-CZ" dirty="0"/>
@@ -5972,13 +5839,6 @@
     <a:masterClrMapping/>
   </p:clrMapOvr>
   <p:transition/>
-  <p:timing>
-    <p:tnLst>
-      <p:par>
-        <p:cTn id="1" dur="indefinite" restart="never" nodeType="tmRoot"/>
-      </p:par>
-    </p:tnLst>
-  </p:timing>
 </p:sld>
 </file>
 
@@ -6022,7 +5882,7 @@
           <a:lstStyle/>
           <a:p>
             <a:r>
-              <a:rPr lang="en-US" dirty="0" smtClean="0"/>
+              <a:rPr lang="en-US" dirty="0"/>
               <a:t>Connectors</a:t>
             </a:r>
             <a:endParaRPr lang="cs-CZ" dirty="0"/>
@@ -6055,67 +5915,67 @@
               <a:buNone/>
             </a:pPr>
             <a:r>
-              <a:rPr lang="cs-CZ" b="1" dirty="0" err="1" smtClean="0"/>
+              <a:rPr lang="cs-CZ" b="1" dirty="0" err="1"/>
               <a:t>Chemical</a:t>
             </a:r>
             <a:r>
-              <a:rPr lang="en-US" b="1" dirty="0" smtClean="0"/>
+              <a:rPr lang="en-US" b="1" dirty="0"/>
               <a:t>Port </a:t>
             </a:r>
-            <a:endParaRPr lang="cs-CZ" dirty="0" smtClean="0"/>
+            <a:endParaRPr lang="cs-CZ" dirty="0"/>
           </a:p>
           <a:p>
             <a:pPr lvl="1" fontAlgn="t"/>
             <a:r>
-              <a:rPr lang="cs-CZ" dirty="0" err="1" smtClean="0"/>
+              <a:rPr lang="cs-CZ" dirty="0" err="1"/>
               <a:t>molar</a:t>
             </a:r>
             <a:r>
-              <a:rPr lang="cs-CZ" dirty="0" smtClean="0"/>
+              <a:rPr lang="cs-CZ" dirty="0"/>
               <a:t> </a:t>
             </a:r>
             <a:r>
-              <a:rPr lang="cs-CZ" dirty="0" err="1" smtClean="0"/>
+              <a:rPr lang="cs-CZ" dirty="0" err="1"/>
               <a:t>concentration</a:t>
             </a:r>
             <a:r>
-              <a:rPr lang="en-US" dirty="0" smtClean="0"/>
+              <a:rPr lang="en-US" dirty="0"/>
               <a:t>,  </a:t>
             </a:r>
             <a:r>
-              <a:rPr lang="cs-CZ" dirty="0" err="1" smtClean="0"/>
+              <a:rPr lang="cs-CZ" dirty="0" err="1"/>
               <a:t>molar</a:t>
             </a:r>
             <a:r>
-              <a:rPr lang="cs-CZ" dirty="0" smtClean="0"/>
+              <a:rPr lang="cs-CZ" dirty="0"/>
               <a:t> </a:t>
             </a:r>
             <a:r>
-              <a:rPr lang="cs-CZ" dirty="0" err="1" smtClean="0"/>
+              <a:rPr lang="cs-CZ" dirty="0" err="1"/>
               <a:t>flow</a:t>
             </a:r>
-            <a:endParaRPr lang="en-US" dirty="0" smtClean="0"/>
+            <a:endParaRPr lang="en-US" dirty="0"/>
           </a:p>
           <a:p>
             <a:pPr lvl="1" fontAlgn="t">
               <a:buNone/>
             </a:pPr>
-            <a:endParaRPr lang="cs-CZ" dirty="0" smtClean="0"/>
+            <a:endParaRPr lang="cs-CZ" dirty="0"/>
           </a:p>
           <a:p>
             <a:pPr marL="0" indent="0">
               <a:buNone/>
             </a:pPr>
             <a:r>
-              <a:rPr lang="en-US" b="1" dirty="0" err="1" smtClean="0"/>
+              <a:rPr lang="en-US" b="1" dirty="0" err="1"/>
               <a:t>HydraulicPort</a:t>
             </a:r>
-            <a:endParaRPr lang="en-US" dirty="0" smtClean="0"/>
+            <a:endParaRPr lang="en-US" dirty="0"/>
           </a:p>
           <a:p>
             <a:pPr lvl="1"/>
             <a:r>
-              <a:rPr lang="en-US" dirty="0" smtClean="0"/>
+              <a:rPr lang="en-US" dirty="0"/>
               <a:t>pressure, volumetric flow</a:t>
             </a:r>
           </a:p>
@@ -6123,55 +5983,55 @@
             <a:pPr lvl="1">
               <a:buNone/>
             </a:pPr>
-            <a:endParaRPr lang="en-US" dirty="0" smtClean="0"/>
+            <a:endParaRPr lang="en-US" dirty="0"/>
           </a:p>
           <a:p>
             <a:pPr marL="0" indent="0">
               <a:buNone/>
             </a:pPr>
             <a:r>
-              <a:rPr lang="en-US" b="1" dirty="0" err="1" smtClean="0"/>
+              <a:rPr lang="en-US" b="1" dirty="0" err="1"/>
               <a:t>ThermalPort</a:t>
             </a:r>
-            <a:endParaRPr lang="en-US" dirty="0" smtClean="0"/>
+            <a:endParaRPr lang="en-US" dirty="0"/>
           </a:p>
           <a:p>
             <a:pPr lvl="1"/>
             <a:r>
-              <a:rPr lang="en-US" dirty="0" smtClean="0"/>
+              <a:rPr lang="en-US" dirty="0"/>
               <a:t>temperature, heat flow</a:t>
             </a:r>
           </a:p>
           <a:p>
             <a:pPr lvl="1"/>
-            <a:endParaRPr lang="en-US" dirty="0" smtClean="0"/>
+            <a:endParaRPr lang="en-US" dirty="0"/>
           </a:p>
           <a:p>
             <a:pPr marL="0" indent="0">
               <a:buNone/>
             </a:pPr>
             <a:r>
-              <a:rPr lang="en-US" b="1" dirty="0" err="1" smtClean="0"/>
+              <a:rPr lang="en-US" b="1" dirty="0" err="1"/>
               <a:t>OsmoticPort</a:t>
             </a:r>
-            <a:endParaRPr lang="en-US" dirty="0" smtClean="0"/>
+            <a:endParaRPr lang="en-US" dirty="0"/>
           </a:p>
           <a:p>
             <a:pPr lvl="1"/>
             <a:r>
-              <a:rPr lang="en-US" dirty="0" smtClean="0"/>
+              <a:rPr lang="en-US" dirty="0"/>
               <a:t>osmolarity, osmotic volumetric flow</a:t>
             </a:r>
           </a:p>
           <a:p>
-            <a:endParaRPr lang="en-US" b="1" dirty="0" smtClean="0"/>
+            <a:endParaRPr lang="en-US" b="1" dirty="0"/>
           </a:p>
           <a:p>
             <a:pPr marL="0" indent="0">
               <a:buNone/>
             </a:pPr>
             <a:r>
-              <a:rPr lang="en-US" b="1" dirty="0" err="1" smtClean="0"/>
+              <a:rPr lang="en-US" b="1" dirty="0" err="1"/>
               <a:t>PopulationPort</a:t>
             </a:r>
             <a:endParaRPr lang="en-US" dirty="0"/>
@@ -6179,14 +6039,13 @@
           <a:p>
             <a:pPr lvl="1"/>
             <a:r>
-              <a:rPr lang="en-US" dirty="0" smtClean="0"/>
+              <a:rPr lang="en-US" dirty="0"/>
               <a:t>size of population, change of population</a:t>
             </a:r>
+          </a:p>
+          <a:p>
+            <a:pPr lvl="1"/>
             <a:endParaRPr lang="en-US" dirty="0"/>
-          </a:p>
-          <a:p>
-            <a:pPr lvl="1"/>
-            <a:endParaRPr lang="en-US" dirty="0" smtClean="0"/>
           </a:p>
         </p:txBody>
       </p:sp>
@@ -6207,7 +6066,7 @@
         </p:blipFill>
         <p:spPr bwMode="auto">
           <a:xfrm>
-            <a:off x="830909" y="1221828"/>
+            <a:off x="827583" y="1258325"/>
             <a:ext cx="905637" cy="432048"/>
           </a:xfrm>
           <a:prstGeom prst="rect">
@@ -6329,13 +6188,6 @@
   <p:clrMapOvr>
     <a:masterClrMapping/>
   </p:clrMapOvr>
-  <p:timing>
-    <p:tnLst>
-      <p:par>
-        <p:cTn id="1" dur="indefinite" restart="never" nodeType="tmRoot"/>
-      </p:par>
-    </p:tnLst>
-  </p:timing>
 </p:sld>
 </file>
 
@@ -6401,7 +6253,7 @@
           <a:lstStyle/>
           <a:p>
             <a:r>
-              <a:rPr lang="en-US" dirty="0" smtClean="0"/>
+              <a:rPr lang="en-US" dirty="0"/>
               <a:t>Chemical</a:t>
             </a:r>
             <a:endParaRPr lang="cs-CZ" dirty="0"/>
@@ -6597,13 +6449,6 @@
   <p:clrMapOvr>
     <a:masterClrMapping/>
   </p:clrMapOvr>
-  <p:timing>
-    <p:tnLst>
-      <p:par>
-        <p:cTn id="1" dur="indefinite" restart="never" nodeType="tmRoot"/>
-      </p:par>
-    </p:tnLst>
-  </p:timing>
 </p:sld>
 </file>
 
@@ -6672,7 +6517,7 @@
           <a:lstStyle/>
           <a:p>
             <a:r>
-              <a:rPr lang="en-US" dirty="0" smtClean="0"/>
+              <a:rPr lang="en-US" dirty="0"/>
               <a:t>CONDITIONAL INPUTS</a:t>
             </a:r>
             <a:endParaRPr lang="cs-CZ" dirty="0"/>
@@ -7138,13 +6983,6 @@
   <p:clrMapOvr>
     <a:masterClrMapping/>
   </p:clrMapOvr>
-  <p:timing>
-    <p:tnLst>
-      <p:par>
-        <p:cTn id="1" dur="indefinite" restart="never" nodeType="tmRoot"/>
-      </p:par>
-    </p:tnLst>
-  </p:timing>
 </p:sld>
 </file>
 

</xml_diff>

<commit_message>
Zaloha zaloznej verze z laptopu.
</commit_message>
<xml_diff>
--- a/Physiolibrary/Resources/Documentation/Physiolibrary v2.3.pptx
+++ b/Physiolibrary/Resources/Documentation/Physiolibrary v2.3.pptx
@@ -142,6 +142,10 @@
 </p:presentation>
 </file>
 
+<file path=ppt/revisionInfo.xml><?xml version="1.0" encoding="utf-8"?>
+<p1510:revInfo xmlns:a="http://schemas.openxmlformats.org/drawingml/2006/main" xmlns:r="http://schemas.openxmlformats.org/officeDocument/2006/relationships" xmlns:p1510="http://schemas.microsoft.com/office/powerpoint/2015/10/main"/>
+</file>
+
 <file path=ppt/slideLayouts/slideLayout1.xml><?xml version="1.0" encoding="utf-8"?>
 <p:sldLayout xmlns:a="http://schemas.openxmlformats.org/drawingml/2006/main" xmlns:r="http://schemas.openxmlformats.org/officeDocument/2006/relationships" xmlns:p="http://schemas.openxmlformats.org/presentationml/2006/main" type="title" preserve="1">
   <p:cSld name="Úvodní snímek">
@@ -180,10 +184,9 @@
           <a:lstStyle/>
           <a:p>
             <a:r>
-              <a:rPr lang="cs-CZ" smtClean="0"/>
+              <a:rPr lang="cs-CZ"/>
               <a:t>Klepnutím lze upravit styl předlohy nadpisů.</a:t>
             </a:r>
-            <a:endParaRPr lang="cs-CZ"/>
           </a:p>
         </p:txBody>
       </p:sp>
@@ -299,10 +302,9 @@
           </a:lstStyle>
           <a:p>
             <a:r>
-              <a:rPr lang="cs-CZ" smtClean="0"/>
+              <a:rPr lang="cs-CZ"/>
               <a:t>Klepnutím lze upravit styl předlohy podnadpisů.</a:t>
             </a:r>
-            <a:endParaRPr lang="cs-CZ"/>
           </a:p>
         </p:txBody>
       </p:sp>
@@ -324,7 +326,7 @@
             <a:fld id="{18A2481B-5154-415F-B752-558547769AA3}" type="datetimeFigureOut">
               <a:rPr lang="cs-CZ" smtClean="0"/>
               <a:pPr/>
-              <a:t>19. 11. 2014</a:t>
+              <a:t>22. 10. 2017</a:t>
             </a:fld>
             <a:endParaRPr lang="cs-CZ"/>
           </a:p>
@@ -414,10 +416,9 @@
           <a:lstStyle/>
           <a:p>
             <a:r>
-              <a:rPr lang="cs-CZ" smtClean="0"/>
+              <a:rPr lang="cs-CZ"/>
               <a:t>Klepnutím lze upravit styl předlohy nadpisů.</a:t>
             </a:r>
-            <a:endParaRPr lang="cs-CZ"/>
           </a:p>
         </p:txBody>
       </p:sp>
@@ -438,38 +439,37 @@
           <a:p>
             <a:pPr lvl="0"/>
             <a:r>
-              <a:rPr lang="cs-CZ" smtClean="0"/>
+              <a:rPr lang="cs-CZ"/>
               <a:t>Klepnutím lze upravit styly předlohy textu.</a:t>
             </a:r>
           </a:p>
           <a:p>
             <a:pPr lvl="1"/>
             <a:r>
-              <a:rPr lang="cs-CZ" smtClean="0"/>
+              <a:rPr lang="cs-CZ"/>
               <a:t>Druhá úroveň</a:t>
             </a:r>
           </a:p>
           <a:p>
             <a:pPr lvl="2"/>
             <a:r>
-              <a:rPr lang="cs-CZ" smtClean="0"/>
+              <a:rPr lang="cs-CZ"/>
               <a:t>Třetí úroveň</a:t>
             </a:r>
           </a:p>
           <a:p>
             <a:pPr lvl="3"/>
             <a:r>
-              <a:rPr lang="cs-CZ" smtClean="0"/>
+              <a:rPr lang="cs-CZ"/>
               <a:t>Čtvrtá úroveň</a:t>
             </a:r>
           </a:p>
           <a:p>
             <a:pPr lvl="4"/>
             <a:r>
-              <a:rPr lang="cs-CZ" smtClean="0"/>
+              <a:rPr lang="cs-CZ"/>
               <a:t>Pátá úroveň</a:t>
             </a:r>
-            <a:endParaRPr lang="cs-CZ"/>
           </a:p>
         </p:txBody>
       </p:sp>
@@ -491,7 +491,7 @@
             <a:fld id="{18A2481B-5154-415F-B752-558547769AA3}" type="datetimeFigureOut">
               <a:rPr lang="cs-CZ" smtClean="0"/>
               <a:pPr/>
-              <a:t>19. 11. 2014</a:t>
+              <a:t>22. 10. 2017</a:t>
             </a:fld>
             <a:endParaRPr lang="cs-CZ"/>
           </a:p>
@@ -586,10 +586,9 @@
           <a:lstStyle/>
           <a:p>
             <a:r>
-              <a:rPr lang="cs-CZ" smtClean="0"/>
+              <a:rPr lang="cs-CZ"/>
               <a:t>Klepnutím lze upravit styl předlohy nadpisů.</a:t>
             </a:r>
-            <a:endParaRPr lang="cs-CZ"/>
           </a:p>
         </p:txBody>
       </p:sp>
@@ -615,38 +614,37 @@
           <a:p>
             <a:pPr lvl="0"/>
             <a:r>
-              <a:rPr lang="cs-CZ" smtClean="0"/>
+              <a:rPr lang="cs-CZ"/>
               <a:t>Klepnutím lze upravit styly předlohy textu.</a:t>
             </a:r>
           </a:p>
           <a:p>
             <a:pPr lvl="1"/>
             <a:r>
-              <a:rPr lang="cs-CZ" smtClean="0"/>
+              <a:rPr lang="cs-CZ"/>
               <a:t>Druhá úroveň</a:t>
             </a:r>
           </a:p>
           <a:p>
             <a:pPr lvl="2"/>
             <a:r>
-              <a:rPr lang="cs-CZ" smtClean="0"/>
+              <a:rPr lang="cs-CZ"/>
               <a:t>Třetí úroveň</a:t>
             </a:r>
           </a:p>
           <a:p>
             <a:pPr lvl="3"/>
             <a:r>
-              <a:rPr lang="cs-CZ" smtClean="0"/>
+              <a:rPr lang="cs-CZ"/>
               <a:t>Čtvrtá úroveň</a:t>
             </a:r>
           </a:p>
           <a:p>
             <a:pPr lvl="4"/>
             <a:r>
-              <a:rPr lang="cs-CZ" smtClean="0"/>
+              <a:rPr lang="cs-CZ"/>
               <a:t>Pátá úroveň</a:t>
             </a:r>
-            <a:endParaRPr lang="cs-CZ"/>
           </a:p>
         </p:txBody>
       </p:sp>
@@ -668,7 +666,7 @@
             <a:fld id="{18A2481B-5154-415F-B752-558547769AA3}" type="datetimeFigureOut">
               <a:rPr lang="cs-CZ" smtClean="0"/>
               <a:pPr/>
-              <a:t>19. 11. 2014</a:t>
+              <a:t>22. 10. 2017</a:t>
             </a:fld>
             <a:endParaRPr lang="cs-CZ"/>
           </a:p>
@@ -758,10 +756,9 @@
           <a:lstStyle/>
           <a:p>
             <a:r>
-              <a:rPr lang="cs-CZ" smtClean="0"/>
+              <a:rPr lang="cs-CZ"/>
               <a:t>Klepnutím lze upravit styl předlohy nadpisů.</a:t>
             </a:r>
-            <a:endParaRPr lang="cs-CZ"/>
           </a:p>
         </p:txBody>
       </p:sp>
@@ -782,38 +779,37 @@
           <a:p>
             <a:pPr lvl="0"/>
             <a:r>
-              <a:rPr lang="cs-CZ" smtClean="0"/>
+              <a:rPr lang="cs-CZ"/>
               <a:t>Klepnutím lze upravit styly předlohy textu.</a:t>
             </a:r>
           </a:p>
           <a:p>
             <a:pPr lvl="1"/>
             <a:r>
-              <a:rPr lang="cs-CZ" smtClean="0"/>
+              <a:rPr lang="cs-CZ"/>
               <a:t>Druhá úroveň</a:t>
             </a:r>
           </a:p>
           <a:p>
             <a:pPr lvl="2"/>
             <a:r>
-              <a:rPr lang="cs-CZ" smtClean="0"/>
+              <a:rPr lang="cs-CZ"/>
               <a:t>Třetí úroveň</a:t>
             </a:r>
           </a:p>
           <a:p>
             <a:pPr lvl="3"/>
             <a:r>
-              <a:rPr lang="cs-CZ" smtClean="0"/>
+              <a:rPr lang="cs-CZ"/>
               <a:t>Čtvrtá úroveň</a:t>
             </a:r>
           </a:p>
           <a:p>
             <a:pPr lvl="4"/>
             <a:r>
-              <a:rPr lang="cs-CZ" smtClean="0"/>
+              <a:rPr lang="cs-CZ"/>
               <a:t>Pátá úroveň</a:t>
             </a:r>
-            <a:endParaRPr lang="cs-CZ"/>
           </a:p>
         </p:txBody>
       </p:sp>
@@ -835,7 +831,7 @@
             <a:fld id="{18A2481B-5154-415F-B752-558547769AA3}" type="datetimeFigureOut">
               <a:rPr lang="cs-CZ" smtClean="0"/>
               <a:pPr/>
-              <a:t>19. 11. 2014</a:t>
+              <a:t>22. 10. 2017</a:t>
             </a:fld>
             <a:endParaRPr lang="cs-CZ"/>
           </a:p>
@@ -934,10 +930,9 @@
           </a:lstStyle>
           <a:p>
             <a:r>
-              <a:rPr lang="cs-CZ" smtClean="0"/>
+              <a:rPr lang="cs-CZ"/>
               <a:t>Klepnutím lze upravit styl předlohy nadpisů.</a:t>
             </a:r>
-            <a:endParaRPr lang="cs-CZ"/>
           </a:p>
         </p:txBody>
       </p:sp>
@@ -1054,7 +1049,7 @@
           <a:p>
             <a:pPr lvl="0"/>
             <a:r>
-              <a:rPr lang="cs-CZ" smtClean="0"/>
+              <a:rPr lang="cs-CZ"/>
               <a:t>Klepnutím lze upravit styly předlohy textu.</a:t>
             </a:r>
           </a:p>
@@ -1078,7 +1073,7 @@
             <a:fld id="{18A2481B-5154-415F-B752-558547769AA3}" type="datetimeFigureOut">
               <a:rPr lang="cs-CZ" smtClean="0"/>
               <a:pPr/>
-              <a:t>19. 11. 2014</a:t>
+              <a:t>22. 10. 2017</a:t>
             </a:fld>
             <a:endParaRPr lang="cs-CZ"/>
           </a:p>
@@ -1168,10 +1163,9 @@
           <a:lstStyle/>
           <a:p>
             <a:r>
-              <a:rPr lang="cs-CZ" smtClean="0"/>
+              <a:rPr lang="cs-CZ"/>
               <a:t>Klepnutím lze upravit styl předlohy nadpisů.</a:t>
             </a:r>
-            <a:endParaRPr lang="cs-CZ"/>
           </a:p>
         </p:txBody>
       </p:sp>
@@ -1225,38 +1219,37 @@
           <a:p>
             <a:pPr lvl="0"/>
             <a:r>
-              <a:rPr lang="cs-CZ" smtClean="0"/>
+              <a:rPr lang="cs-CZ"/>
               <a:t>Klepnutím lze upravit styly předlohy textu.</a:t>
             </a:r>
           </a:p>
           <a:p>
             <a:pPr lvl="1"/>
             <a:r>
-              <a:rPr lang="cs-CZ" smtClean="0"/>
+              <a:rPr lang="cs-CZ"/>
               <a:t>Druhá úroveň</a:t>
             </a:r>
           </a:p>
           <a:p>
             <a:pPr lvl="2"/>
             <a:r>
-              <a:rPr lang="cs-CZ" smtClean="0"/>
+              <a:rPr lang="cs-CZ"/>
               <a:t>Třetí úroveň</a:t>
             </a:r>
           </a:p>
           <a:p>
             <a:pPr lvl="3"/>
             <a:r>
-              <a:rPr lang="cs-CZ" smtClean="0"/>
+              <a:rPr lang="cs-CZ"/>
               <a:t>Čtvrtá úroveň</a:t>
             </a:r>
           </a:p>
           <a:p>
             <a:pPr lvl="4"/>
             <a:r>
-              <a:rPr lang="cs-CZ" smtClean="0"/>
+              <a:rPr lang="cs-CZ"/>
               <a:t>Pátá úroveň</a:t>
             </a:r>
-            <a:endParaRPr lang="cs-CZ"/>
           </a:p>
         </p:txBody>
       </p:sp>
@@ -1310,38 +1303,37 @@
           <a:p>
             <a:pPr lvl="0"/>
             <a:r>
-              <a:rPr lang="cs-CZ" smtClean="0"/>
+              <a:rPr lang="cs-CZ"/>
               <a:t>Klepnutím lze upravit styly předlohy textu.</a:t>
             </a:r>
           </a:p>
           <a:p>
             <a:pPr lvl="1"/>
             <a:r>
-              <a:rPr lang="cs-CZ" smtClean="0"/>
+              <a:rPr lang="cs-CZ"/>
               <a:t>Druhá úroveň</a:t>
             </a:r>
           </a:p>
           <a:p>
             <a:pPr lvl="2"/>
             <a:r>
-              <a:rPr lang="cs-CZ" smtClean="0"/>
+              <a:rPr lang="cs-CZ"/>
               <a:t>Třetí úroveň</a:t>
             </a:r>
           </a:p>
           <a:p>
             <a:pPr lvl="3"/>
             <a:r>
-              <a:rPr lang="cs-CZ" smtClean="0"/>
+              <a:rPr lang="cs-CZ"/>
               <a:t>Čtvrtá úroveň</a:t>
             </a:r>
           </a:p>
           <a:p>
             <a:pPr lvl="4"/>
             <a:r>
-              <a:rPr lang="cs-CZ" smtClean="0"/>
+              <a:rPr lang="cs-CZ"/>
               <a:t>Pátá úroveň</a:t>
             </a:r>
-            <a:endParaRPr lang="cs-CZ"/>
           </a:p>
         </p:txBody>
       </p:sp>
@@ -1363,7 +1355,7 @@
             <a:fld id="{18A2481B-5154-415F-B752-558547769AA3}" type="datetimeFigureOut">
               <a:rPr lang="cs-CZ" smtClean="0"/>
               <a:pPr/>
-              <a:t>19. 11. 2014</a:t>
+              <a:t>22. 10. 2017</a:t>
             </a:fld>
             <a:endParaRPr lang="cs-CZ"/>
           </a:p>
@@ -1457,10 +1449,9 @@
           </a:lstStyle>
           <a:p>
             <a:r>
-              <a:rPr lang="cs-CZ" smtClean="0"/>
+              <a:rPr lang="cs-CZ"/>
               <a:t>Klepnutím lze upravit styl předlohy nadpisů.</a:t>
             </a:r>
-            <a:endParaRPr lang="cs-CZ"/>
           </a:p>
         </p:txBody>
       </p:sp>
@@ -1523,7 +1514,7 @@
           <a:p>
             <a:pPr lvl="0"/>
             <a:r>
-              <a:rPr lang="cs-CZ" smtClean="0"/>
+              <a:rPr lang="cs-CZ"/>
               <a:t>Klepnutím lze upravit styly předlohy textu.</a:t>
             </a:r>
           </a:p>
@@ -1579,38 +1570,37 @@
           <a:p>
             <a:pPr lvl="0"/>
             <a:r>
-              <a:rPr lang="cs-CZ" smtClean="0"/>
+              <a:rPr lang="cs-CZ"/>
               <a:t>Klepnutím lze upravit styly předlohy textu.</a:t>
             </a:r>
           </a:p>
           <a:p>
             <a:pPr lvl="1"/>
             <a:r>
-              <a:rPr lang="cs-CZ" smtClean="0"/>
+              <a:rPr lang="cs-CZ"/>
               <a:t>Druhá úroveň</a:t>
             </a:r>
           </a:p>
           <a:p>
             <a:pPr lvl="2"/>
             <a:r>
-              <a:rPr lang="cs-CZ" smtClean="0"/>
+              <a:rPr lang="cs-CZ"/>
               <a:t>Třetí úroveň</a:t>
             </a:r>
           </a:p>
           <a:p>
             <a:pPr lvl="3"/>
             <a:r>
-              <a:rPr lang="cs-CZ" smtClean="0"/>
+              <a:rPr lang="cs-CZ"/>
               <a:t>Čtvrtá úroveň</a:t>
             </a:r>
           </a:p>
           <a:p>
             <a:pPr lvl="4"/>
             <a:r>
-              <a:rPr lang="cs-CZ" smtClean="0"/>
+              <a:rPr lang="cs-CZ"/>
               <a:t>Pátá úroveň</a:t>
             </a:r>
-            <a:endParaRPr lang="cs-CZ"/>
           </a:p>
         </p:txBody>
       </p:sp>
@@ -1673,7 +1663,7 @@
           <a:p>
             <a:pPr lvl="0"/>
             <a:r>
-              <a:rPr lang="cs-CZ" smtClean="0"/>
+              <a:rPr lang="cs-CZ"/>
               <a:t>Klepnutím lze upravit styly předlohy textu.</a:t>
             </a:r>
           </a:p>
@@ -1729,38 +1719,37 @@
           <a:p>
             <a:pPr lvl="0"/>
             <a:r>
-              <a:rPr lang="cs-CZ" smtClean="0"/>
+              <a:rPr lang="cs-CZ"/>
               <a:t>Klepnutím lze upravit styly předlohy textu.</a:t>
             </a:r>
           </a:p>
           <a:p>
             <a:pPr lvl="1"/>
             <a:r>
-              <a:rPr lang="cs-CZ" smtClean="0"/>
+              <a:rPr lang="cs-CZ"/>
               <a:t>Druhá úroveň</a:t>
             </a:r>
           </a:p>
           <a:p>
             <a:pPr lvl="2"/>
             <a:r>
-              <a:rPr lang="cs-CZ" smtClean="0"/>
+              <a:rPr lang="cs-CZ"/>
               <a:t>Třetí úroveň</a:t>
             </a:r>
           </a:p>
           <a:p>
             <a:pPr lvl="3"/>
             <a:r>
-              <a:rPr lang="cs-CZ" smtClean="0"/>
+              <a:rPr lang="cs-CZ"/>
               <a:t>Čtvrtá úroveň</a:t>
             </a:r>
           </a:p>
           <a:p>
             <a:pPr lvl="4"/>
             <a:r>
-              <a:rPr lang="cs-CZ" smtClean="0"/>
+              <a:rPr lang="cs-CZ"/>
               <a:t>Pátá úroveň</a:t>
             </a:r>
-            <a:endParaRPr lang="cs-CZ"/>
           </a:p>
         </p:txBody>
       </p:sp>
@@ -1782,7 +1771,7 @@
             <a:fld id="{18A2481B-5154-415F-B752-558547769AA3}" type="datetimeFigureOut">
               <a:rPr lang="cs-CZ" smtClean="0"/>
               <a:pPr/>
-              <a:t>19. 11. 2014</a:t>
+              <a:t>22. 10. 2017</a:t>
             </a:fld>
             <a:endParaRPr lang="cs-CZ"/>
           </a:p>
@@ -1872,10 +1861,9 @@
           <a:lstStyle/>
           <a:p>
             <a:r>
-              <a:rPr lang="cs-CZ" smtClean="0"/>
+              <a:rPr lang="cs-CZ"/>
               <a:t>Klepnutím lze upravit styl předlohy nadpisů.</a:t>
             </a:r>
-            <a:endParaRPr lang="cs-CZ"/>
           </a:p>
         </p:txBody>
       </p:sp>
@@ -1897,7 +1885,7 @@
             <a:fld id="{18A2481B-5154-415F-B752-558547769AA3}" type="datetimeFigureOut">
               <a:rPr lang="cs-CZ" smtClean="0"/>
               <a:pPr/>
-              <a:t>19. 11. 2014</a:t>
+              <a:t>22. 10. 2017</a:t>
             </a:fld>
             <a:endParaRPr lang="cs-CZ"/>
           </a:p>
@@ -1989,7 +1977,7 @@
             <a:fld id="{18A2481B-5154-415F-B752-558547769AA3}" type="datetimeFigureOut">
               <a:rPr lang="cs-CZ" smtClean="0"/>
               <a:pPr/>
-              <a:t>19. 11. 2014</a:t>
+              <a:t>22. 10. 2017</a:t>
             </a:fld>
             <a:endParaRPr lang="cs-CZ"/>
           </a:p>
@@ -2088,10 +2076,9 @@
           </a:lstStyle>
           <a:p>
             <a:r>
-              <a:rPr lang="cs-CZ" smtClean="0"/>
+              <a:rPr lang="cs-CZ"/>
               <a:t>Klepnutím lze upravit styl předlohy nadpisů.</a:t>
             </a:r>
-            <a:endParaRPr lang="cs-CZ"/>
           </a:p>
         </p:txBody>
       </p:sp>
@@ -2145,38 +2132,37 @@
           <a:p>
             <a:pPr lvl="0"/>
             <a:r>
-              <a:rPr lang="cs-CZ" smtClean="0"/>
+              <a:rPr lang="cs-CZ"/>
               <a:t>Klepnutím lze upravit styly předlohy textu.</a:t>
             </a:r>
           </a:p>
           <a:p>
             <a:pPr lvl="1"/>
             <a:r>
-              <a:rPr lang="cs-CZ" smtClean="0"/>
+              <a:rPr lang="cs-CZ"/>
               <a:t>Druhá úroveň</a:t>
             </a:r>
           </a:p>
           <a:p>
             <a:pPr lvl="2"/>
             <a:r>
-              <a:rPr lang="cs-CZ" smtClean="0"/>
+              <a:rPr lang="cs-CZ"/>
               <a:t>Třetí úroveň</a:t>
             </a:r>
           </a:p>
           <a:p>
             <a:pPr lvl="3"/>
             <a:r>
-              <a:rPr lang="cs-CZ" smtClean="0"/>
+              <a:rPr lang="cs-CZ"/>
               <a:t>Čtvrtá úroveň</a:t>
             </a:r>
           </a:p>
           <a:p>
             <a:pPr lvl="4"/>
             <a:r>
-              <a:rPr lang="cs-CZ" smtClean="0"/>
+              <a:rPr lang="cs-CZ"/>
               <a:t>Pátá úroveň</a:t>
             </a:r>
-            <a:endParaRPr lang="cs-CZ"/>
           </a:p>
         </p:txBody>
       </p:sp>
@@ -2239,7 +2225,7 @@
           <a:p>
             <a:pPr lvl="0"/>
             <a:r>
-              <a:rPr lang="cs-CZ" smtClean="0"/>
+              <a:rPr lang="cs-CZ"/>
               <a:t>Klepnutím lze upravit styly předlohy textu.</a:t>
             </a:r>
           </a:p>
@@ -2263,7 +2249,7 @@
             <a:fld id="{18A2481B-5154-415F-B752-558547769AA3}" type="datetimeFigureOut">
               <a:rPr lang="cs-CZ" smtClean="0"/>
               <a:pPr/>
-              <a:t>19. 11. 2014</a:t>
+              <a:t>22. 10. 2017</a:t>
             </a:fld>
             <a:endParaRPr lang="cs-CZ"/>
           </a:p>
@@ -2362,10 +2348,9 @@
           </a:lstStyle>
           <a:p>
             <a:r>
-              <a:rPr lang="cs-CZ" smtClean="0"/>
+              <a:rPr lang="cs-CZ"/>
               <a:t>Klepnutím lze upravit styl předlohy nadpisů.</a:t>
             </a:r>
-            <a:endParaRPr lang="cs-CZ"/>
           </a:p>
         </p:txBody>
       </p:sp>
@@ -2489,7 +2474,7 @@
           <a:p>
             <a:pPr lvl="0"/>
             <a:r>
-              <a:rPr lang="cs-CZ" smtClean="0"/>
+              <a:rPr lang="cs-CZ"/>
               <a:t>Klepnutím lze upravit styly předlohy textu.</a:t>
             </a:r>
           </a:p>
@@ -2513,7 +2498,7 @@
             <a:fld id="{18A2481B-5154-415F-B752-558547769AA3}" type="datetimeFigureOut">
               <a:rPr lang="cs-CZ" smtClean="0"/>
               <a:pPr/>
-              <a:t>19. 11. 2014</a:t>
+              <a:t>22. 10. 2017</a:t>
             </a:fld>
             <a:endParaRPr lang="cs-CZ"/>
           </a:p>
@@ -2618,10 +2603,9 @@
           <a:lstStyle/>
           <a:p>
             <a:r>
-              <a:rPr lang="cs-CZ" smtClean="0"/>
+              <a:rPr lang="cs-CZ"/>
               <a:t>Klepnutím lze upravit styl předlohy nadpisů.</a:t>
             </a:r>
-            <a:endParaRPr lang="cs-CZ"/>
           </a:p>
         </p:txBody>
       </p:sp>
@@ -2652,38 +2636,37 @@
           <a:p>
             <a:pPr lvl="0"/>
             <a:r>
-              <a:rPr lang="cs-CZ" smtClean="0"/>
+              <a:rPr lang="cs-CZ"/>
               <a:t>Klepnutím lze upravit styly předlohy textu.</a:t>
             </a:r>
           </a:p>
           <a:p>
             <a:pPr lvl="1"/>
             <a:r>
-              <a:rPr lang="cs-CZ" smtClean="0"/>
+              <a:rPr lang="cs-CZ"/>
               <a:t>Druhá úroveň</a:t>
             </a:r>
           </a:p>
           <a:p>
             <a:pPr lvl="2"/>
             <a:r>
-              <a:rPr lang="cs-CZ" smtClean="0"/>
+              <a:rPr lang="cs-CZ"/>
               <a:t>Třetí úroveň</a:t>
             </a:r>
           </a:p>
           <a:p>
             <a:pPr lvl="3"/>
             <a:r>
-              <a:rPr lang="cs-CZ" smtClean="0"/>
+              <a:rPr lang="cs-CZ"/>
               <a:t>Čtvrtá úroveň</a:t>
             </a:r>
           </a:p>
           <a:p>
             <a:pPr lvl="4"/>
             <a:r>
-              <a:rPr lang="cs-CZ" smtClean="0"/>
+              <a:rPr lang="cs-CZ"/>
               <a:t>Pátá úroveň</a:t>
             </a:r>
-            <a:endParaRPr lang="cs-CZ"/>
           </a:p>
         </p:txBody>
       </p:sp>
@@ -2723,7 +2706,7 @@
             <a:fld id="{18A2481B-5154-415F-B752-558547769AA3}" type="datetimeFigureOut">
               <a:rPr lang="cs-CZ" smtClean="0"/>
               <a:pPr/>
-              <a:t>19. 11. 2014</a:t>
+              <a:t>22. 10. 2017</a:t>
             </a:fld>
             <a:endParaRPr lang="cs-CZ"/>
           </a:p>
@@ -3110,11 +3093,11 @@
           <a:lstStyle/>
           <a:p>
             <a:r>
-              <a:rPr lang="en-US" dirty="0" err="1" smtClean="0"/>
+              <a:rPr lang="en-US" dirty="0" err="1"/>
               <a:t>Physiolibrary</a:t>
             </a:r>
             <a:r>
-              <a:rPr lang="en-US" dirty="0" smtClean="0"/>
+              <a:rPr lang="en-US" dirty="0"/>
               <a:t> 2.3</a:t>
             </a:r>
             <a:endParaRPr lang="cs-CZ" dirty="0"/>
@@ -3137,7 +3120,7 @@
           <a:lstStyle/>
           <a:p>
             <a:r>
-              <a:rPr lang="en-US" dirty="0" smtClean="0"/>
+              <a:rPr lang="en-US" dirty="0"/>
               <a:t>www.physiolibrary.org</a:t>
             </a:r>
             <a:endParaRPr lang="cs-CZ" dirty="0"/>
@@ -3149,13 +3132,6 @@
   <p:clrMapOvr>
     <a:masterClrMapping/>
   </p:clrMapOvr>
-  <p:timing>
-    <p:tnLst>
-      <p:par>
-        <p:cTn id="1" dur="indefinite" restart="never" nodeType="tmRoot"/>
-      </p:par>
-    </p:tnLst>
-  </p:timing>
 </p:sld>
 </file>
 
@@ -3192,7 +3168,7 @@
           <a:lstStyle/>
           <a:p>
             <a:r>
-              <a:rPr lang="en-US" dirty="0" smtClean="0"/>
+              <a:rPr lang="en-US" dirty="0"/>
               <a:t>Chemical Reaction</a:t>
             </a:r>
             <a:endParaRPr lang="cs-CZ" dirty="0"/>
@@ -3260,13 +3236,6 @@
   <p:clrMapOvr>
     <a:masterClrMapping/>
   </p:clrMapOvr>
-  <p:timing>
-    <p:tnLst>
-      <p:par>
-        <p:cTn id="1" dur="indefinite" restart="never" nodeType="tmRoot"/>
-      </p:par>
-    </p:tnLst>
-  </p:timing>
 </p:sld>
 </file>
 
@@ -3303,7 +3272,7 @@
           <a:lstStyle/>
           <a:p>
             <a:r>
-              <a:rPr lang="en-US" dirty="0" smtClean="0"/>
+              <a:rPr lang="en-US" dirty="0"/>
               <a:t>Chemical Reaction</a:t>
             </a:r>
             <a:endParaRPr lang="cs-CZ" dirty="0"/>
@@ -3371,13 +3340,6 @@
   <p:clrMapOvr>
     <a:masterClrMapping/>
   </p:clrMapOvr>
-  <p:timing>
-    <p:tnLst>
-      <p:par>
-        <p:cTn id="1" dur="indefinite" restart="never" nodeType="tmRoot"/>
-      </p:par>
-    </p:tnLst>
-  </p:timing>
 </p:sld>
 </file>
 
@@ -3414,7 +3376,7 @@
           <a:lstStyle/>
           <a:p>
             <a:r>
-              <a:rPr lang="en-US" dirty="0" smtClean="0"/>
+              <a:rPr lang="en-US" dirty="0"/>
               <a:t>Chemical Reaction</a:t>
             </a:r>
             <a:endParaRPr lang="cs-CZ" dirty="0"/>
@@ -3482,13 +3444,6 @@
   <p:clrMapOvr>
     <a:masterClrMapping/>
   </p:clrMapOvr>
-  <p:timing>
-    <p:tnLst>
-      <p:par>
-        <p:cTn id="1" dur="indefinite" restart="never" nodeType="tmRoot"/>
-      </p:par>
-    </p:tnLst>
-  </p:timing>
 </p:sld>
 </file>
 
@@ -3572,16 +3527,12 @@
           <a:lstStyle/>
           <a:p>
             <a:r>
-              <a:rPr lang="cs-CZ" dirty="0" smtClean="0"/>
+              <a:rPr lang="cs-CZ" dirty="0"/>
               <a:t>ARRAY</a:t>
             </a:r>
             <a:r>
-              <a:rPr lang="en-US" dirty="0" smtClean="0"/>
-              <a:t> </a:t>
-            </a:r>
-            <a:r>
-              <a:rPr lang="en-US" dirty="0" smtClean="0"/>
-              <a:t>INPUTS</a:t>
+              <a:rPr lang="en-US" dirty="0"/>
+              <a:t> INPUTS</a:t>
             </a:r>
             <a:endParaRPr lang="cs-CZ" dirty="0"/>
           </a:p>
@@ -3661,13 +3612,6 @@
   <p:clrMapOvr>
     <a:masterClrMapping/>
   </p:clrMapOvr>
-  <p:timing>
-    <p:tnLst>
-      <p:par>
-        <p:cTn id="1" dur="indefinite" restart="never" nodeType="tmRoot"/>
-      </p:par>
-    </p:tnLst>
-  </p:timing>
 </p:sld>
 </file>
 
@@ -3704,7 +3648,7 @@
           <a:lstStyle/>
           <a:p>
             <a:r>
-              <a:rPr lang="en-US" dirty="0" smtClean="0"/>
+              <a:rPr lang="en-US" dirty="0"/>
               <a:t>STEADY STATES</a:t>
             </a:r>
             <a:endParaRPr lang="cs-CZ" dirty="0"/>
@@ -3732,15 +3676,15 @@
           <a:lstStyle/>
           <a:p>
             <a:r>
-              <a:rPr lang="en-US" dirty="0" smtClean="0"/>
+              <a:rPr lang="en-US" dirty="0"/>
               <a:t>Zero derivations (</a:t>
             </a:r>
             <a:r>
-              <a:rPr lang="en-US" i="1" dirty="0" smtClean="0"/>
+              <a:rPr lang="en-US" i="1" dirty="0"/>
               <a:t>dependent equation set</a:t>
             </a:r>
             <a:r>
-              <a:rPr lang="en-US" dirty="0" smtClean="0"/>
+              <a:rPr lang="en-US" dirty="0"/>
               <a:t>)</a:t>
             </a:r>
           </a:p>
@@ -4080,13 +4024,6 @@
     <a:masterClrMapping/>
   </p:clrMapOvr>
   <p:transition/>
-  <p:timing>
-    <p:tnLst>
-      <p:par>
-        <p:cTn id="1" dur="indefinite" restart="never" nodeType="tmRoot"/>
-      </p:par>
-    </p:tnLst>
-  </p:timing>
 </p:sld>
 </file>
 
@@ -4160,7 +4097,7 @@
           <a:lstStyle/>
           <a:p>
             <a:r>
-              <a:rPr lang="en-US" dirty="0" smtClean="0"/>
+              <a:rPr lang="en-US" dirty="0"/>
               <a:t>Hydraulic</a:t>
             </a:r>
             <a:endParaRPr lang="cs-CZ" dirty="0"/>
@@ -4196,13 +4133,6 @@
   <p:clrMapOvr>
     <a:masterClrMapping/>
   </p:clrMapOvr>
-  <p:timing>
-    <p:tnLst>
-      <p:par>
-        <p:cTn id="1" dur="indefinite" restart="never" nodeType="tmRoot"/>
-      </p:par>
-    </p:tnLst>
-  </p:timing>
 </p:sld>
 </file>
 
@@ -4268,7 +4198,7 @@
           <a:lstStyle/>
           <a:p>
             <a:r>
-              <a:rPr lang="en-US" dirty="0" smtClean="0"/>
+              <a:rPr lang="en-US" dirty="0"/>
               <a:t>Osmotic</a:t>
             </a:r>
             <a:endParaRPr lang="cs-CZ" dirty="0"/>
@@ -4464,13 +4394,6 @@
   <p:clrMapOvr>
     <a:masterClrMapping/>
   </p:clrMapOvr>
-  <p:timing>
-    <p:tnLst>
-      <p:par>
-        <p:cTn id="1" dur="indefinite" restart="never" nodeType="tmRoot"/>
-      </p:par>
-    </p:tnLst>
-  </p:timing>
 </p:sld>
 </file>
 
@@ -4536,7 +4459,7 @@
           <a:lstStyle/>
           <a:p>
             <a:r>
-              <a:rPr lang="en-US" dirty="0" smtClean="0"/>
+              <a:rPr lang="en-US" dirty="0"/>
               <a:t>Population</a:t>
             </a:r>
             <a:endParaRPr lang="cs-CZ" dirty="0"/>
@@ -4641,13 +4564,6 @@
   <p:clrMapOvr>
     <a:masterClrMapping/>
   </p:clrMapOvr>
-  <p:timing>
-    <p:tnLst>
-      <p:par>
-        <p:cTn id="1" dur="indefinite" restart="never" nodeType="tmRoot"/>
-      </p:par>
-    </p:tnLst>
-  </p:timing>
 </p:sld>
 </file>
 
@@ -4785,7 +4701,7 @@
           <a:lstStyle/>
           <a:p>
             <a:r>
-              <a:rPr lang="en-US" dirty="0" smtClean="0"/>
+              <a:rPr lang="en-US" dirty="0"/>
               <a:t>Thermal</a:t>
             </a:r>
             <a:endParaRPr lang="cs-CZ" dirty="0"/>
@@ -4861,13 +4777,6 @@
   <p:clrMapOvr>
     <a:masterClrMapping/>
   </p:clrMapOvr>
-  <p:timing>
-    <p:tnLst>
-      <p:par>
-        <p:cTn id="1" dur="indefinite" restart="never" nodeType="tmRoot"/>
-      </p:par>
-    </p:tnLst>
-  </p:timing>
 </p:sld>
 </file>
 
@@ -4963,13 +4872,6 @@
   <p:clrMapOvr>
     <a:masterClrMapping/>
   </p:clrMapOvr>
-  <p:timing>
-    <p:tnLst>
-      <p:par>
-        <p:cTn id="1" dur="indefinite" restart="never" nodeType="tmRoot"/>
-      </p:par>
-    </p:tnLst>
-  </p:timing>
 </p:sld>
 </file>
 
@@ -5030,7 +4932,7 @@
           <a:lstStyle/>
           <a:p>
             <a:r>
-              <a:rPr lang="en-US" dirty="0" smtClean="0"/>
+              <a:rPr lang="en-US" dirty="0"/>
               <a:t>Physiolibrary Structure</a:t>
             </a:r>
             <a:endParaRPr lang="cs-CZ" dirty="0"/>
@@ -5186,13 +5088,6 @@
   <p:clrMapOvr>
     <a:masterClrMapping/>
   </p:clrMapOvr>
-  <p:timing>
-    <p:tnLst>
-      <p:par>
-        <p:cTn id="1" dur="indefinite" restart="never" nodeType="tmRoot"/>
-      </p:par>
-    </p:tnLst>
-  </p:timing>
 </p:sld>
 </file>
 
@@ -5234,7 +5129,7 @@
           <a:lstStyle/>
           <a:p>
             <a:r>
-              <a:rPr lang="en-US" dirty="0" smtClean="0"/>
+              <a:rPr lang="en-US" dirty="0"/>
               <a:t>Thank you for your attention!</a:t>
             </a:r>
             <a:endParaRPr lang="cs-CZ" dirty="0"/>
@@ -5265,7 +5160,7 @@
               <a:buNone/>
             </a:pPr>
             <a:r>
-              <a:rPr lang="en-US" dirty="0" smtClean="0"/>
+              <a:rPr lang="en-US" dirty="0"/>
               <a:t>www.physiolibrary.org</a:t>
             </a:r>
             <a:endParaRPr lang="cs-CZ" dirty="0"/>
@@ -5277,13 +5172,6 @@
   <p:clrMapOvr>
     <a:masterClrMapping/>
   </p:clrMapOvr>
-  <p:timing>
-    <p:tnLst>
-      <p:par>
-        <p:cTn id="1" dur="indefinite" restart="never" nodeType="tmRoot"/>
-      </p:par>
-    </p:tnLst>
-  </p:timing>
 </p:sld>
 </file>
 
@@ -5325,7 +5213,7 @@
           <a:lstStyle/>
           <a:p>
             <a:r>
-              <a:rPr lang="en-US" dirty="0" smtClean="0"/>
+              <a:rPr lang="en-US" dirty="0"/>
               <a:t>Icons</a:t>
             </a:r>
             <a:endParaRPr lang="cs-CZ" dirty="0"/>
@@ -5361,13 +5249,6 @@
   <p:clrMapOvr>
     <a:masterClrMapping/>
   </p:clrMapOvr>
-  <p:timing>
-    <p:tnLst>
-      <p:par>
-        <p:cTn id="1" dur="indefinite" restart="never" nodeType="tmRoot"/>
-      </p:par>
-    </p:tnLst>
-  </p:timing>
 </p:sld>
 </file>
 
@@ -5409,7 +5290,7 @@
           <a:lstStyle/>
           <a:p>
             <a:r>
-              <a:rPr lang="en-US" dirty="0" err="1" smtClean="0"/>
+              <a:rPr lang="en-US" dirty="0" err="1"/>
               <a:t>Blocks.Factors</a:t>
             </a:r>
             <a:endParaRPr lang="cs-CZ" dirty="0"/>
@@ -5517,13 +5398,6 @@
   <p:clrMapOvr>
     <a:masterClrMapping/>
   </p:clrMapOvr>
-  <p:timing>
-    <p:tnLst>
-      <p:par>
-        <p:cTn id="1" dur="indefinite" restart="never" nodeType="tmRoot"/>
-      </p:par>
-    </p:tnLst>
-  </p:timing>
 </p:sld>
 </file>
 
@@ -5560,7 +5434,7 @@
           <a:lstStyle/>
           <a:p>
             <a:r>
-              <a:rPr lang="en-US" dirty="0" smtClean="0"/>
+              <a:rPr lang="en-US" dirty="0"/>
               <a:t>Types</a:t>
             </a:r>
             <a:endParaRPr lang="cs-CZ" dirty="0"/>
@@ -5740,13 +5614,6 @@
   <p:clrMapOvr>
     <a:masterClrMapping/>
   </p:clrMapOvr>
-  <p:timing>
-    <p:tnLst>
-      <p:par>
-        <p:cTn id="1" dur="indefinite" restart="never" nodeType="tmRoot"/>
-      </p:par>
-    </p:tnLst>
-  </p:timing>
 </p:sld>
 </file>
 
@@ -5783,7 +5650,7 @@
           <a:lstStyle/>
           <a:p>
             <a:r>
-              <a:rPr lang="en-US" dirty="0" err="1" smtClean="0"/>
+              <a:rPr lang="en-US" dirty="0" err="1"/>
               <a:t>Types.Constants</a:t>
             </a:r>
             <a:endParaRPr lang="cs-CZ" dirty="0"/>
@@ -5972,13 +5839,6 @@
     <a:masterClrMapping/>
   </p:clrMapOvr>
   <p:transition/>
-  <p:timing>
-    <p:tnLst>
-      <p:par>
-        <p:cTn id="1" dur="indefinite" restart="never" nodeType="tmRoot"/>
-      </p:par>
-    </p:tnLst>
-  </p:timing>
 </p:sld>
 </file>
 
@@ -6022,7 +5882,7 @@
           <a:lstStyle/>
           <a:p>
             <a:r>
-              <a:rPr lang="en-US" dirty="0" smtClean="0"/>
+              <a:rPr lang="en-US" dirty="0"/>
               <a:t>Connectors</a:t>
             </a:r>
             <a:endParaRPr lang="cs-CZ" dirty="0"/>
@@ -6055,67 +5915,67 @@
               <a:buNone/>
             </a:pPr>
             <a:r>
-              <a:rPr lang="cs-CZ" b="1" dirty="0" err="1" smtClean="0"/>
+              <a:rPr lang="cs-CZ" b="1" dirty="0" err="1"/>
               <a:t>Chemical</a:t>
             </a:r>
             <a:r>
-              <a:rPr lang="en-US" b="1" dirty="0" smtClean="0"/>
+              <a:rPr lang="en-US" b="1" dirty="0"/>
               <a:t>Port </a:t>
             </a:r>
-            <a:endParaRPr lang="cs-CZ" dirty="0" smtClean="0"/>
+            <a:endParaRPr lang="cs-CZ" dirty="0"/>
           </a:p>
           <a:p>
             <a:pPr lvl="1" fontAlgn="t"/>
             <a:r>
-              <a:rPr lang="cs-CZ" dirty="0" err="1" smtClean="0"/>
+              <a:rPr lang="cs-CZ" dirty="0" err="1"/>
               <a:t>molar</a:t>
             </a:r>
             <a:r>
-              <a:rPr lang="cs-CZ" dirty="0" smtClean="0"/>
+              <a:rPr lang="cs-CZ" dirty="0"/>
               <a:t> </a:t>
             </a:r>
             <a:r>
-              <a:rPr lang="cs-CZ" dirty="0" err="1" smtClean="0"/>
+              <a:rPr lang="cs-CZ" dirty="0" err="1"/>
               <a:t>concentration</a:t>
             </a:r>
             <a:r>
-              <a:rPr lang="en-US" dirty="0" smtClean="0"/>
+              <a:rPr lang="en-US" dirty="0"/>
               <a:t>,  </a:t>
             </a:r>
             <a:r>
-              <a:rPr lang="cs-CZ" dirty="0" err="1" smtClean="0"/>
+              <a:rPr lang="cs-CZ" dirty="0" err="1"/>
               <a:t>molar</a:t>
             </a:r>
             <a:r>
-              <a:rPr lang="cs-CZ" dirty="0" smtClean="0"/>
+              <a:rPr lang="cs-CZ" dirty="0"/>
               <a:t> </a:t>
             </a:r>
             <a:r>
-              <a:rPr lang="cs-CZ" dirty="0" err="1" smtClean="0"/>
+              <a:rPr lang="cs-CZ" dirty="0" err="1"/>
               <a:t>flow</a:t>
             </a:r>
-            <a:endParaRPr lang="en-US" dirty="0" smtClean="0"/>
+            <a:endParaRPr lang="en-US" dirty="0"/>
           </a:p>
           <a:p>
             <a:pPr lvl="1" fontAlgn="t">
               <a:buNone/>
             </a:pPr>
-            <a:endParaRPr lang="cs-CZ" dirty="0" smtClean="0"/>
+            <a:endParaRPr lang="cs-CZ" dirty="0"/>
           </a:p>
           <a:p>
             <a:pPr marL="0" indent="0">
               <a:buNone/>
             </a:pPr>
             <a:r>
-              <a:rPr lang="en-US" b="1" dirty="0" err="1" smtClean="0"/>
+              <a:rPr lang="en-US" b="1" dirty="0" err="1"/>
               <a:t>HydraulicPort</a:t>
             </a:r>
-            <a:endParaRPr lang="en-US" dirty="0" smtClean="0"/>
+            <a:endParaRPr lang="en-US" dirty="0"/>
           </a:p>
           <a:p>
             <a:pPr lvl="1"/>
             <a:r>
-              <a:rPr lang="en-US" dirty="0" smtClean="0"/>
+              <a:rPr lang="en-US" dirty="0"/>
               <a:t>pressure, volumetric flow</a:t>
             </a:r>
           </a:p>
@@ -6123,55 +5983,55 @@
             <a:pPr lvl="1">
               <a:buNone/>
             </a:pPr>
-            <a:endParaRPr lang="en-US" dirty="0" smtClean="0"/>
+            <a:endParaRPr lang="en-US" dirty="0"/>
           </a:p>
           <a:p>
             <a:pPr marL="0" indent="0">
               <a:buNone/>
             </a:pPr>
             <a:r>
-              <a:rPr lang="en-US" b="1" dirty="0" err="1" smtClean="0"/>
+              <a:rPr lang="en-US" b="1" dirty="0" err="1"/>
               <a:t>ThermalPort</a:t>
             </a:r>
-            <a:endParaRPr lang="en-US" dirty="0" smtClean="0"/>
+            <a:endParaRPr lang="en-US" dirty="0"/>
           </a:p>
           <a:p>
             <a:pPr lvl="1"/>
             <a:r>
-              <a:rPr lang="en-US" dirty="0" smtClean="0"/>
+              <a:rPr lang="en-US" dirty="0"/>
               <a:t>temperature, heat flow</a:t>
             </a:r>
           </a:p>
           <a:p>
             <a:pPr lvl="1"/>
-            <a:endParaRPr lang="en-US" dirty="0" smtClean="0"/>
+            <a:endParaRPr lang="en-US" dirty="0"/>
           </a:p>
           <a:p>
             <a:pPr marL="0" indent="0">
               <a:buNone/>
             </a:pPr>
             <a:r>
-              <a:rPr lang="en-US" b="1" dirty="0" err="1" smtClean="0"/>
+              <a:rPr lang="en-US" b="1" dirty="0" err="1"/>
               <a:t>OsmoticPort</a:t>
             </a:r>
-            <a:endParaRPr lang="en-US" dirty="0" smtClean="0"/>
+            <a:endParaRPr lang="en-US" dirty="0"/>
           </a:p>
           <a:p>
             <a:pPr lvl="1"/>
             <a:r>
-              <a:rPr lang="en-US" dirty="0" smtClean="0"/>
+              <a:rPr lang="en-US" dirty="0"/>
               <a:t>osmolarity, osmotic volumetric flow</a:t>
             </a:r>
           </a:p>
           <a:p>
-            <a:endParaRPr lang="en-US" b="1" dirty="0" smtClean="0"/>
+            <a:endParaRPr lang="en-US" b="1" dirty="0"/>
           </a:p>
           <a:p>
             <a:pPr marL="0" indent="0">
               <a:buNone/>
             </a:pPr>
             <a:r>
-              <a:rPr lang="en-US" b="1" dirty="0" err="1" smtClean="0"/>
+              <a:rPr lang="en-US" b="1" dirty="0" err="1"/>
               <a:t>PopulationPort</a:t>
             </a:r>
             <a:endParaRPr lang="en-US" dirty="0"/>
@@ -6179,14 +6039,13 @@
           <a:p>
             <a:pPr lvl="1"/>
             <a:r>
-              <a:rPr lang="en-US" dirty="0" smtClean="0"/>
+              <a:rPr lang="en-US" dirty="0"/>
               <a:t>size of population, change of population</a:t>
             </a:r>
+          </a:p>
+          <a:p>
+            <a:pPr lvl="1"/>
             <a:endParaRPr lang="en-US" dirty="0"/>
-          </a:p>
-          <a:p>
-            <a:pPr lvl="1"/>
-            <a:endParaRPr lang="en-US" dirty="0" smtClean="0"/>
           </a:p>
         </p:txBody>
       </p:sp>
@@ -6207,7 +6066,7 @@
         </p:blipFill>
         <p:spPr bwMode="auto">
           <a:xfrm>
-            <a:off x="830909" y="1221828"/>
+            <a:off x="827583" y="1258325"/>
             <a:ext cx="905637" cy="432048"/>
           </a:xfrm>
           <a:prstGeom prst="rect">
@@ -6329,13 +6188,6 @@
   <p:clrMapOvr>
     <a:masterClrMapping/>
   </p:clrMapOvr>
-  <p:timing>
-    <p:tnLst>
-      <p:par>
-        <p:cTn id="1" dur="indefinite" restart="never" nodeType="tmRoot"/>
-      </p:par>
-    </p:tnLst>
-  </p:timing>
 </p:sld>
 </file>
 
@@ -6401,7 +6253,7 @@
           <a:lstStyle/>
           <a:p>
             <a:r>
-              <a:rPr lang="en-US" dirty="0" smtClean="0"/>
+              <a:rPr lang="en-US" dirty="0"/>
               <a:t>Chemical</a:t>
             </a:r>
             <a:endParaRPr lang="cs-CZ" dirty="0"/>
@@ -6597,13 +6449,6 @@
   <p:clrMapOvr>
     <a:masterClrMapping/>
   </p:clrMapOvr>
-  <p:timing>
-    <p:tnLst>
-      <p:par>
-        <p:cTn id="1" dur="indefinite" restart="never" nodeType="tmRoot"/>
-      </p:par>
-    </p:tnLst>
-  </p:timing>
 </p:sld>
 </file>
 
@@ -6672,7 +6517,7 @@
           <a:lstStyle/>
           <a:p>
             <a:r>
-              <a:rPr lang="en-US" dirty="0" smtClean="0"/>
+              <a:rPr lang="en-US" dirty="0"/>
               <a:t>CONDITIONAL INPUTS</a:t>
             </a:r>
             <a:endParaRPr lang="cs-CZ" dirty="0"/>
@@ -7138,13 +6983,6 @@
   <p:clrMapOvr>
     <a:masterClrMapping/>
   </p:clrMapOvr>
-  <p:timing>
-    <p:tnLst>
-      <p:par>
-        <p:cTn id="1" dur="indefinite" restart="never" nodeType="tmRoot"/>
-      </p:par>
-    </p:tnLst>
-  </p:timing>
 </p:sld>
 </file>
 

</xml_diff>